<commit_message>
Schematic and Pitch Prez Update
</commit_message>
<xml_diff>
--- a/A.1 Pitch Presentation/The_Talking_Mailbox_Pitch.pptx
+++ b/A.1 Pitch Presentation/The_Talking_Mailbox_Pitch.pptx
@@ -16,8 +16,8 @@
     <p:sldId id="297" r:id="rId7"/>
     <p:sldId id="298" r:id="rId8"/>
     <p:sldId id="301" r:id="rId9"/>
-    <p:sldId id="299" r:id="rId10"/>
-    <p:sldId id="302" r:id="rId11"/>
+    <p:sldId id="302" r:id="rId10"/>
+    <p:sldId id="299" r:id="rId11"/>
   </p:sldIdLst>
   <p:sldSz cx="9144000" cy="5143500" type="screen16x9"/>
   <p:notesSz cx="6858000" cy="9144000"/>
@@ -1535,6 +1535,13 @@
             <a:tailEnd type="none" w="sm" len="sm"/>
           </a:ln>
         </p:spPr>
+        <p:txBody>
+          <a:bodyPr/>
+          <a:lstStyle/>
+          <a:p>
+            <a:endParaRPr lang="en-US" dirty="0"/>
+          </a:p>
+        </p:txBody>
       </p:sp>
       <p:sp>
         <p:nvSpPr>
@@ -1961,6 +1968,13 @@
             </a:pathLst>
           </a:custGeom>
         </p:spPr>
+        <p:txBody>
+          <a:bodyPr/>
+          <a:lstStyle/>
+          <a:p>
+            <a:endParaRPr lang="en-US" dirty="0"/>
+          </a:p>
+        </p:txBody>
       </p:sp>
       <p:sp>
         <p:nvSpPr>
@@ -1996,7 +2010,7 @@
               </a:spcAft>
               <a:buNone/>
             </a:pPr>
-            <a:endParaRPr/>
+            <a:endParaRPr dirty="0"/>
           </a:p>
         </p:txBody>
       </p:sp>
@@ -2065,6 +2079,13 @@
             </a:pathLst>
           </a:custGeom>
         </p:spPr>
+        <p:txBody>
+          <a:bodyPr/>
+          <a:lstStyle/>
+          <a:p>
+            <a:endParaRPr lang="en-US" dirty="0"/>
+          </a:p>
+        </p:txBody>
       </p:sp>
       <p:sp>
         <p:nvSpPr>
@@ -2100,7 +2121,7 @@
               </a:spcAft>
               <a:buNone/>
             </a:pPr>
-            <a:endParaRPr/>
+            <a:endParaRPr dirty="0"/>
           </a:p>
         </p:txBody>
       </p:sp>
@@ -2169,6 +2190,13 @@
             </a:pathLst>
           </a:custGeom>
         </p:spPr>
+        <p:txBody>
+          <a:bodyPr/>
+          <a:lstStyle/>
+          <a:p>
+            <a:endParaRPr lang="en-US" dirty="0"/>
+          </a:p>
+        </p:txBody>
       </p:sp>
       <p:sp>
         <p:nvSpPr>
@@ -2204,7 +2232,7 @@
               </a:spcAft>
               <a:buNone/>
             </a:pPr>
-            <a:endParaRPr/>
+            <a:endParaRPr dirty="0"/>
           </a:p>
         </p:txBody>
       </p:sp>
@@ -2273,6 +2301,13 @@
             </a:pathLst>
           </a:custGeom>
         </p:spPr>
+        <p:txBody>
+          <a:bodyPr/>
+          <a:lstStyle/>
+          <a:p>
+            <a:endParaRPr lang="en-US" dirty="0"/>
+          </a:p>
+        </p:txBody>
       </p:sp>
       <p:sp>
         <p:nvSpPr>
@@ -2308,7 +2343,7 @@
               </a:spcAft>
               <a:buNone/>
             </a:pPr>
-            <a:endParaRPr/>
+            <a:endParaRPr dirty="0"/>
           </a:p>
         </p:txBody>
       </p:sp>
@@ -2377,6 +2412,13 @@
             </a:pathLst>
           </a:custGeom>
         </p:spPr>
+        <p:txBody>
+          <a:bodyPr/>
+          <a:lstStyle/>
+          <a:p>
+            <a:endParaRPr lang="en-US" dirty="0"/>
+          </a:p>
+        </p:txBody>
       </p:sp>
       <p:sp>
         <p:nvSpPr>
@@ -2412,7 +2454,7 @@
               </a:spcAft>
               <a:buNone/>
             </a:pPr>
-            <a:endParaRPr/>
+            <a:endParaRPr dirty="0"/>
           </a:p>
         </p:txBody>
       </p:sp>
@@ -3871,6 +3913,13 @@
             <a:noFill/>
           </a:ln>
         </p:spPr>
+        <p:txBody>
+          <a:bodyPr/>
+          <a:lstStyle/>
+          <a:p>
+            <a:endParaRPr lang="en-US" dirty="0"/>
+          </a:p>
+        </p:txBody>
       </p:sp>
       <p:grpSp>
         <p:nvGrpSpPr>
@@ -4737,6 +4786,13 @@
             <a:noFill/>
           </a:ln>
         </p:spPr>
+        <p:txBody>
+          <a:bodyPr/>
+          <a:lstStyle/>
+          <a:p>
+            <a:endParaRPr lang="en-US" dirty="0"/>
+          </a:p>
+        </p:txBody>
       </p:sp>
       <p:sp>
         <p:nvSpPr>
@@ -10357,7 +10413,7 @@
         <p:spPr>
           <a:xfrm>
             <a:off x="2406326" y="4433150"/>
-            <a:ext cx="4309048" cy="341700"/>
+            <a:ext cx="5228188" cy="341700"/>
           </a:xfrm>
           <a:prstGeom prst="rect">
             <a:avLst/>
@@ -10392,7 +10448,7 @@
                 <a:cs typeface="Roboto"/>
                 <a:sym typeface="Roboto"/>
               </a:rPr>
-              <a:t>By Abhinav Kothari and Justin Chin Cheong</a:t>
+              <a:t>By Abhinav Kothari (33349) and Justin Chin Cheong (34140)</a:t>
             </a:r>
             <a:endParaRPr dirty="0">
               <a:solidFill>
@@ -10460,7 +10516,7 @@
         <p:cNvPr id="1" name="">
           <a:extLst>
             <a:ext uri="{FF2B5EF4-FFF2-40B4-BE49-F238E27FC236}">
-              <a16:creationId xmlns:a16="http://schemas.microsoft.com/office/drawing/2014/main" id="{AA91EEED-5820-6CBE-67C8-0A0B0C0F81C0}"/>
+              <a16:creationId xmlns:a16="http://schemas.microsoft.com/office/drawing/2014/main" id="{E57C1B96-4FD5-091A-7475-084EA7C28AF3}"/>
             </a:ext>
           </a:extLst>
         </p:cNvPr>
@@ -10480,7 +10536,7 @@
           <p:cNvPr id="4" name="Title 3">
             <a:extLst>
               <a:ext uri="{FF2B5EF4-FFF2-40B4-BE49-F238E27FC236}">
-                <a16:creationId xmlns:a16="http://schemas.microsoft.com/office/drawing/2014/main" id="{54CB886F-A4DC-CFA8-4443-9A51FD4AAFD2}"/>
+                <a16:creationId xmlns:a16="http://schemas.microsoft.com/office/drawing/2014/main" id="{B0B4ADFD-D59D-66D1-9BD3-51237F212719}"/>
               </a:ext>
             </a:extLst>
           </p:cNvPr>
@@ -10498,7 +10554,7 @@
           <a:p>
             <a:r>
               <a:rPr lang="en-US" dirty="0"/>
-              <a:t>Price Estimates</a:t>
+              <a:t>Attribution Links</a:t>
             </a:r>
             <a:endParaRPr lang="LID4096" dirty="0"/>
           </a:p>
@@ -10509,7 +10565,7 @@
           <p:cNvPr id="5" name="TextBox 4">
             <a:extLst>
               <a:ext uri="{FF2B5EF4-FFF2-40B4-BE49-F238E27FC236}">
-                <a16:creationId xmlns:a16="http://schemas.microsoft.com/office/drawing/2014/main" id="{E6CB8B3A-6EB8-88C3-4B5D-790035042C7C}"/>
+                <a16:creationId xmlns:a16="http://schemas.microsoft.com/office/drawing/2014/main" id="{45496EE4-BE0E-F889-1F60-7BE09F9AF945}"/>
               </a:ext>
             </a:extLst>
           </p:cNvPr>
@@ -10534,7 +10590,36 @@
           <a:p>
             <a:r>
               <a:rPr lang="en-US" dirty="0"/>
-              <a:t>Estimates</a:t>
+              <a:t>Some icons were used from flaticons, here are the attribution links:</a:t>
+            </a:r>
+          </a:p>
+          <a:p>
+            <a:endParaRPr lang="en-US" dirty="0"/>
+          </a:p>
+          <a:p>
+            <a:pPr marL="285750" indent="-285750">
+              <a:buFont typeface="Arial" panose="020B0604020202020204" pitchFamily="34" charset="0"/>
+              <a:buChar char="•"/>
+            </a:pPr>
+            <a:r>
+              <a:rPr lang="en-US" dirty="0">
+                <a:hlinkClick r:id="rId2"/>
+              </a:rPr>
+              <a:t>https://www.flaticon.com/free-icons/light-dependent-resistor</a:t>
+            </a:r>
+            <a:r>
+              <a:rPr lang="en-US" dirty="0"/>
+              <a:t> : Light dependent resistor icons created by verluk </a:t>
+            </a:r>
+            <a:r>
+              <a:rPr lang="en-US" dirty="0">
+                <a:hlinkClick r:id="rId3"/>
+              </a:rPr>
+              <a:t>–</a:t>
+            </a:r>
+            <a:r>
+              <a:rPr lang="en-US" dirty="0"/>
+              <a:t> Flaticon</a:t>
             </a:r>
           </a:p>
           <a:p>
@@ -10543,12 +10628,14 @@
               <a:buChar char="•"/>
             </a:pPr>
             <a:r>
-              <a:rPr lang="en-US"/>
-              <a:t>Weight Sensor : 20.00 </a:t>
+              <a:rPr lang="en-US" dirty="0">
+                <a:hlinkClick r:id="rId3"/>
+              </a:rPr>
+              <a:t>https://www.flaticon.com/free-icons/antenna</a:t>
             </a:r>
             <a:r>
               <a:rPr lang="en-US" dirty="0"/>
-              <a:t>euros</a:t>
+              <a:t> : Antenna icons created by Freepik – Flaticon</a:t>
             </a:r>
           </a:p>
           <a:p>
@@ -10557,53 +10644,15 @@
               <a:buChar char="•"/>
             </a:pPr>
             <a:r>
-              <a:rPr lang="en-US" dirty="0"/>
-              <a:t>RBS311104: Digital Tilt Sensor : 3.00 euros</a:t>
-            </a:r>
-          </a:p>
-          <a:p>
-            <a:pPr marL="285750" indent="-285750">
-              <a:buFont typeface="Arial" panose="020B0604020202020204" pitchFamily="34" charset="0"/>
-              <a:buChar char="•"/>
-            </a:pPr>
-            <a:r>
-              <a:rPr lang="en-US" dirty="0"/>
-              <a:t>ESP 32 </a:t>
-            </a:r>
-            <a:r>
-              <a:rPr lang="en-US" dirty="0" err="1"/>
-              <a:t>Heltec</a:t>
+              <a:rPr lang="en-US" dirty="0">
+                <a:hlinkClick r:id="rId4"/>
+              </a:rPr>
+              <a:t>https://www.flaticon.com/free-icons/spirit-level</a:t>
             </a:r>
             <a:r>
               <a:rPr lang="en-US" dirty="0"/>
-              <a:t> : 32 euros</a:t>
+              <a:t> : Spirit level icons created by juicy_fish - Flaticon</a:t>
             </a:r>
-          </a:p>
-          <a:p>
-            <a:pPr marL="285750" indent="-285750">
-              <a:buFont typeface="Arial" panose="020B0604020202020204" pitchFamily="34" charset="0"/>
-              <a:buChar char="•"/>
-            </a:pPr>
-            <a:r>
-              <a:rPr lang="en-US" dirty="0"/>
-              <a:t>PDV-P9203 : LDR : 0.88 euros</a:t>
-            </a:r>
-          </a:p>
-          <a:p>
-            <a:pPr marL="285750" indent="-285750">
-              <a:buFont typeface="Arial" panose="020B0604020202020204" pitchFamily="34" charset="0"/>
-              <a:buChar char="•"/>
-            </a:pPr>
-            <a:r>
-              <a:rPr lang="en-US" dirty="0"/>
-              <a:t>Housing estimate : 20 euros (extreme case)</a:t>
-            </a:r>
-          </a:p>
-          <a:p>
-            <a:pPr marL="285750" indent="-285750">
-              <a:buFont typeface="Arial" panose="020B0604020202020204" pitchFamily="34" charset="0"/>
-              <a:buChar char="•"/>
-            </a:pPr>
             <a:endParaRPr lang="LID4096" dirty="0"/>
           </a:p>
         </p:txBody>
@@ -10611,7 +10660,7 @@
     </p:spTree>
     <p:extLst>
       <p:ext uri="{BB962C8B-B14F-4D97-AF65-F5344CB8AC3E}">
-        <p14:creationId xmlns:p14="http://schemas.microsoft.com/office/powerpoint/2010/main" val="981409818"/>
+        <p14:creationId xmlns:p14="http://schemas.microsoft.com/office/powerpoint/2010/main" val="2045045057"/>
       </p:ext>
     </p:extLst>
   </p:cSld>
@@ -11019,7 +11068,7 @@
             </a:pPr>
             <a:r>
               <a:rPr lang="en-US" dirty="0"/>
-              <a:t>Pressure sensor to detect post in box</a:t>
+              <a:t>Weight sensor to detect post in box</a:t>
             </a:r>
           </a:p>
           <a:p>
@@ -11421,7 +11470,15 @@
             </a:pPr>
             <a:r>
               <a:rPr lang="en" dirty="0"/>
-              <a:t>Use a pressure sensor to detect if a post comes in</a:t>
+              <a:t>Use a </a:t>
+            </a:r>
+            <a:r>
+              <a:rPr lang="en-US" dirty="0"/>
+              <a:t>weight</a:t>
+            </a:r>
+            <a:r>
+              <a:rPr lang="en" dirty="0"/>
+              <a:t> sensor to detect if a post comes in</a:t>
             </a:r>
             <a:endParaRPr dirty="0"/>
           </a:p>
@@ -11497,15 +11554,7 @@
             <a:pPr marL="0" indent="0"/>
             <a:r>
               <a:rPr lang="en-US" dirty="0"/>
-              <a:t>Detecting post triggers </a:t>
-            </a:r>
-            <a:r>
-              <a:rPr lang="en-US" dirty="0" err="1"/>
-              <a:t>LoRaWAN</a:t>
-            </a:r>
-            <a:r>
-              <a:rPr lang="en-US" dirty="0"/>
-              <a:t> gateway notification (website/mail)</a:t>
+              <a:t>Detecting post triggers LoRaWAN gateway notification (website/mail)</a:t>
             </a:r>
           </a:p>
           <a:p>
@@ -11847,8 +11896,8 @@
         </p:blipFill>
         <p:spPr>
           <a:xfrm>
-            <a:off x="5104890" y="659468"/>
-            <a:ext cx="3253388" cy="3711830"/>
+            <a:off x="5083119" y="795260"/>
+            <a:ext cx="3253388" cy="3614414"/>
           </a:xfrm>
           <a:prstGeom prst="rect">
             <a:avLst/>
@@ -11980,7 +12029,7 @@
                 <a:buNone/>
               </a:pPr>
               <a:r>
-                <a:rPr lang="en" sz="1800" b="1" dirty="0">
+                <a:rPr lang="en-US" sz="1800" b="1" dirty="0">
                   <a:solidFill>
                     <a:schemeClr val="dk1"/>
                   </a:solidFill>
@@ -11991,6 +12040,15 @@
                 </a:rPr>
                 <a:t>Weight</a:t>
               </a:r>
+              <a:endParaRPr lang="en" sz="1800" b="1" dirty="0">
+                <a:solidFill>
+                  <a:schemeClr val="dk1"/>
+                </a:solidFill>
+                <a:latin typeface="Manrope"/>
+                <a:ea typeface="Manrope"/>
+                <a:cs typeface="Manrope"/>
+                <a:sym typeface="Manrope"/>
+              </a:endParaRPr>
             </a:p>
             <a:p>
               <a:pPr marL="0" lvl="0" indent="0" algn="ctr" rtl="0">
@@ -12359,7 +12417,7 @@
                   <a:cs typeface="Manrope"/>
                   <a:sym typeface="Manrope"/>
                 </a:rPr>
-                <a:t>WiFi LoRa Heltec</a:t>
+                <a:t>WiFi LoRa ESP32</a:t>
               </a:r>
               <a:endParaRPr sz="1800" b="1" dirty="0">
                 <a:solidFill>
@@ -13005,7 +13063,7 @@
                 <a:rPr lang="en-US" dirty="0"/>
               </a:br>
               <a:r>
-                <a:rPr lang="en-US" dirty="0" err="1"/>
+                <a:rPr lang="en-US" dirty="0"/>
                 <a:t>LoRaWAN</a:t>
               </a:r>
               <a:br>
@@ -13439,7 +13497,7 @@
         <p:spPr>
           <a:xfrm>
             <a:off x="720001" y="1017725"/>
-            <a:ext cx="7704000" cy="2031325"/>
+            <a:ext cx="7704000" cy="2462213"/>
           </a:xfrm>
           <a:prstGeom prst="rect">
             <a:avLst/>
@@ -13454,15 +13512,7 @@
           <a:p>
             <a:r>
               <a:rPr lang="en-US" dirty="0"/>
-              <a:t>For the </a:t>
-            </a:r>
-            <a:r>
-              <a:rPr lang="en-US" dirty="0" err="1"/>
-              <a:t>The</a:t>
-            </a:r>
-            <a:r>
-              <a:rPr lang="en-US" dirty="0"/>
-              <a:t> Talking Door to be a satisfiable product, the following functional requirements must be implemented:</a:t>
+              <a:t>For The Talking Door to be a satisfiable product, the following functional requirements must be implemented:</a:t>
             </a:r>
           </a:p>
           <a:p>
@@ -13475,7 +13525,7 @@
             </a:pPr>
             <a:r>
               <a:rPr lang="en-US" dirty="0"/>
-              <a:t>It can detect if a mail is in the mailbox</a:t>
+              <a:t>It can detect whether or not mail is present within the mailbox</a:t>
             </a:r>
           </a:p>
           <a:p>
@@ -13505,15 +13555,7 @@
             </a:pPr>
             <a:r>
               <a:rPr lang="en-US" dirty="0"/>
-              <a:t>It can communicate if a mail is in the box to a website (based on </a:t>
-            </a:r>
-            <a:r>
-              <a:rPr lang="en-US" dirty="0" err="1"/>
-              <a:t>LoRaWAN</a:t>
-            </a:r>
-            <a:r>
-              <a:rPr lang="en-US" dirty="0"/>
-              <a:t>)</a:t>
+              <a:t>It can communicate if a mail is in the box to a website (based on LoRaWAN)</a:t>
             </a:r>
           </a:p>
           <a:p>
@@ -13534,6 +13576,26 @@
             <a:r>
               <a:rPr lang="en-US" dirty="0"/>
               <a:t>It alerts the responsible person via email or dashboard upon mail detection</a:t>
+            </a:r>
+          </a:p>
+          <a:p>
+            <a:pPr marL="285750" indent="-285750">
+              <a:buFont typeface="Arial" panose="020B0604020202020204" pitchFamily="34" charset="0"/>
+              <a:buChar char="•"/>
+            </a:pPr>
+            <a:r>
+              <a:rPr lang="en-US" dirty="0"/>
+              <a:t>It sends battery status updates to a website every hour</a:t>
+            </a:r>
+          </a:p>
+          <a:p>
+            <a:pPr marL="285750" indent="-285750">
+              <a:buFont typeface="Arial" panose="020B0604020202020204" pitchFamily="34" charset="0"/>
+              <a:buChar char="•"/>
+            </a:pPr>
+            <a:r>
+              <a:rPr lang="en-US" dirty="0"/>
+              <a:t>It sends a low battery warning to a website when the battery falls below a defined threshold</a:t>
             </a:r>
           </a:p>
         </p:txBody>
@@ -13618,7 +13680,7 @@
         <p:spPr>
           <a:xfrm>
             <a:off x="720001" y="1017725"/>
-            <a:ext cx="7704000" cy="2462213"/>
+            <a:ext cx="7704000" cy="3323987"/>
           </a:xfrm>
           <a:prstGeom prst="rect">
             <a:avLst/>
@@ -13633,15 +13695,7 @@
           <a:p>
             <a:r>
               <a:rPr lang="en-US" dirty="0"/>
-              <a:t>For the </a:t>
-            </a:r>
-            <a:r>
-              <a:rPr lang="en-US" dirty="0" err="1"/>
-              <a:t>The</a:t>
-            </a:r>
-            <a:r>
-              <a:rPr lang="en-US" dirty="0"/>
-              <a:t> Talking Door to operate and perform its functions, the following technical requirements must be implemented:</a:t>
+              <a:t>For The Talking Door to operate and perform its functions, the following technical requirements must be implemented:</a:t>
             </a:r>
           </a:p>
           <a:p>
@@ -13654,7 +13708,7 @@
             </a:pPr>
             <a:r>
               <a:rPr lang="en-US" dirty="0"/>
-              <a:t>The pressure sensor can detect when a piece of mail has been placed within the box</a:t>
+              <a:t>The weight sensor can detect a change in weight of approximately 20g. This indicates when a piece of mail has been placed within the box</a:t>
             </a:r>
           </a:p>
           <a:p>
@@ -13664,7 +13718,7 @@
             </a:pPr>
             <a:r>
               <a:rPr lang="en-US" dirty="0"/>
-              <a:t>The tilt sensor can detect the rotation of the post box lid hence detecting if it opened</a:t>
+              <a:t>The tilt sensor can detect the rotation of the post box lid. This indicates when the lid is opened.</a:t>
             </a:r>
           </a:p>
           <a:p>
@@ -13674,7 +13728,7 @@
             </a:pPr>
             <a:r>
               <a:rPr lang="en-US" dirty="0"/>
-              <a:t>The LDR can detect the change in light intensity when the lid is opened </a:t>
+              <a:t>The LDR can detect the change in light intensity by a defined threshold. This indicates when the lid is opened.</a:t>
             </a:r>
           </a:p>
           <a:p>
@@ -13684,30 +13738,7 @@
             </a:pPr>
             <a:r>
               <a:rPr lang="en-US" dirty="0"/>
-              <a:t>The transmitter can reliably connect and communicate via the </a:t>
-            </a:r>
-            <a:r>
-              <a:rPr lang="en-US" dirty="0" err="1"/>
-              <a:t>LoRaWAN</a:t>
-            </a:r>
-            <a:endParaRPr lang="en-US" dirty="0"/>
-          </a:p>
-          <a:p>
-            <a:pPr marL="285750" indent="-285750">
-              <a:buFont typeface="Arial" panose="020B0604020202020204" pitchFamily="34" charset="0"/>
-              <a:buChar char="•"/>
-            </a:pPr>
-            <a:r>
-              <a:rPr lang="en-US" dirty="0"/>
-              <a:t>The server the </a:t>
-            </a:r>
-            <a:r>
-              <a:rPr lang="en-US" dirty="0" err="1"/>
-              <a:t>LoRaWAN</a:t>
-            </a:r>
-            <a:r>
-              <a:rPr lang="en-US" dirty="0"/>
-              <a:t> communicates too can notify the personnel about the mail</a:t>
+              <a:t>The transmitter can reliably connect and communicate via the LoRaWAN Gateway.</a:t>
             </a:r>
           </a:p>
           <a:p>
@@ -13717,7 +13748,17 @@
             </a:pPr>
             <a:r>
               <a:rPr lang="en-US" dirty="0"/>
-              <a:t>The power supply is a battery with a working voltage of 3.3V to 5.5V</a:t>
+              <a:t>The server with which the LoRaWAN communicates, can send emails to relevant personnel about the mail.</a:t>
+            </a:r>
+          </a:p>
+          <a:p>
+            <a:pPr marL="285750" indent="-285750">
+              <a:buFont typeface="Arial" panose="020B0604020202020204" pitchFamily="34" charset="0"/>
+              <a:buChar char="•"/>
+            </a:pPr>
+            <a:r>
+              <a:rPr lang="en-US" dirty="0"/>
+              <a:t>The power supply is a battery with a working voltage of 3.1V to 5.5V</a:t>
             </a:r>
           </a:p>
           <a:p>
@@ -13737,7 +13778,7 @@
             </a:pPr>
             <a:r>
               <a:rPr lang="en-US" dirty="0"/>
-              <a:t>Should function at temperatures ranging 0-40°C and humidity 10-90%</a:t>
+              <a:t>The system should function at temperatures ranging 0-40°C and humidity 10-90%</a:t>
             </a:r>
           </a:p>
         </p:txBody>
@@ -13763,7 +13804,7 @@
         <p:cNvPr id="1" name="">
           <a:extLst>
             <a:ext uri="{FF2B5EF4-FFF2-40B4-BE49-F238E27FC236}">
-              <a16:creationId xmlns:a16="http://schemas.microsoft.com/office/drawing/2014/main" id="{E57C1B96-4FD5-091A-7475-084EA7C28AF3}"/>
+              <a16:creationId xmlns:a16="http://schemas.microsoft.com/office/drawing/2014/main" id="{AA91EEED-5820-6CBE-67C8-0A0B0C0F81C0}"/>
             </a:ext>
           </a:extLst>
         </p:cNvPr>
@@ -13783,7 +13824,7 @@
           <p:cNvPr id="4" name="Title 3">
             <a:extLst>
               <a:ext uri="{FF2B5EF4-FFF2-40B4-BE49-F238E27FC236}">
-                <a16:creationId xmlns:a16="http://schemas.microsoft.com/office/drawing/2014/main" id="{B0B4ADFD-D59D-66D1-9BD3-51237F212719}"/>
+                <a16:creationId xmlns:a16="http://schemas.microsoft.com/office/drawing/2014/main" id="{54CB886F-A4DC-CFA8-4443-9A51FD4AAFD2}"/>
               </a:ext>
             </a:extLst>
           </p:cNvPr>
@@ -13801,159 +13842,458 @@
           <a:p>
             <a:r>
               <a:rPr lang="en-US" dirty="0"/>
-              <a:t>Attribution Links</a:t>
+              <a:t>Price Estimates</a:t>
             </a:r>
             <a:endParaRPr lang="LID4096" dirty="0"/>
           </a:p>
         </p:txBody>
       </p:sp>
-      <p:sp>
-        <p:nvSpPr>
-          <p:cNvPr id="5" name="TextBox 4">
+      <p:graphicFrame>
+        <p:nvGraphicFramePr>
+          <p:cNvPr id="2" name="Table 1">
             <a:extLst>
               <a:ext uri="{FF2B5EF4-FFF2-40B4-BE49-F238E27FC236}">
-                <a16:creationId xmlns:a16="http://schemas.microsoft.com/office/drawing/2014/main" id="{45496EE4-BE0E-F889-1F60-7BE09F9AF945}"/>
+                <a16:creationId xmlns:a16="http://schemas.microsoft.com/office/drawing/2014/main" id="{6D59289E-10DA-BE7D-3602-054D99864F75}"/>
               </a:ext>
             </a:extLst>
           </p:cNvPr>
-          <p:cNvSpPr txBox="1"/>
-          <p:nvPr/>
-        </p:nvSpPr>
-        <p:spPr>
-          <a:xfrm>
-            <a:off x="720001" y="1017725"/>
-            <a:ext cx="7704000" cy="1600438"/>
-          </a:xfrm>
-          <a:prstGeom prst="rect">
-            <a:avLst/>
-          </a:prstGeom>
-          <a:noFill/>
-        </p:spPr>
-        <p:txBody>
-          <a:bodyPr wrap="square" rtlCol="0">
-            <a:spAutoFit/>
-          </a:bodyPr>
-          <a:lstStyle/>
-          <a:p>
-            <a:r>
-              <a:rPr lang="en-US" dirty="0"/>
-              <a:t>Some icons were used from </a:t>
-            </a:r>
-            <a:r>
-              <a:rPr lang="en-US" dirty="0" err="1"/>
-              <a:t>flaticons</a:t>
-            </a:r>
-            <a:r>
-              <a:rPr lang="en-US" dirty="0"/>
-              <a:t>, here are the attribution links:</a:t>
-            </a:r>
-          </a:p>
-          <a:p>
-            <a:endParaRPr lang="en-US" dirty="0"/>
-          </a:p>
-          <a:p>
-            <a:pPr marL="285750" indent="-285750">
-              <a:buFont typeface="Arial" panose="020B0604020202020204" pitchFamily="34" charset="0"/>
-              <a:buChar char="•"/>
-            </a:pPr>
-            <a:r>
-              <a:rPr lang="en-US" dirty="0">
-                <a:hlinkClick r:id="rId2"/>
-              </a:rPr>
-              <a:t>https://www.flaticon.com/free-icons/light-dependent-resistor</a:t>
-            </a:r>
-            <a:r>
-              <a:rPr lang="en-US" dirty="0"/>
-              <a:t> : Light dependent resistor icons created by </a:t>
-            </a:r>
-            <a:r>
-              <a:rPr lang="en-US" dirty="0" err="1"/>
-              <a:t>verluk</a:t>
-            </a:r>
-            <a:r>
-              <a:rPr lang="en-US" dirty="0"/>
-              <a:t> </a:t>
-            </a:r>
-            <a:r>
-              <a:rPr lang="en-US" dirty="0">
-                <a:hlinkClick r:id="rId3"/>
-              </a:rPr>
-              <a:t>–</a:t>
-            </a:r>
-            <a:r>
-              <a:rPr lang="en-US" dirty="0"/>
-              <a:t> </a:t>
-            </a:r>
-            <a:r>
-              <a:rPr lang="en-US" dirty="0" err="1"/>
-              <a:t>Flaticon</a:t>
-            </a:r>
-            <a:endParaRPr lang="en-US" dirty="0"/>
-          </a:p>
-          <a:p>
-            <a:pPr marL="285750" indent="-285750">
-              <a:buFont typeface="Arial" panose="020B0604020202020204" pitchFamily="34" charset="0"/>
-              <a:buChar char="•"/>
-            </a:pPr>
-            <a:r>
-              <a:rPr lang="en-US" dirty="0">
-                <a:hlinkClick r:id="rId3"/>
-              </a:rPr>
-              <a:t>https://www.flaticon.com/free-icons/antenna</a:t>
-            </a:r>
-            <a:r>
-              <a:rPr lang="en-US" dirty="0"/>
-              <a:t> : Antenna icons created by </a:t>
-            </a:r>
-            <a:r>
-              <a:rPr lang="en-US" dirty="0" err="1"/>
-              <a:t>Freepik</a:t>
-            </a:r>
-            <a:r>
-              <a:rPr lang="en-US" dirty="0"/>
-              <a:t> – </a:t>
-            </a:r>
-            <a:r>
-              <a:rPr lang="en-US" dirty="0" err="1"/>
-              <a:t>Flaticon</a:t>
-            </a:r>
-            <a:endParaRPr lang="en-US" dirty="0"/>
-          </a:p>
-          <a:p>
-            <a:pPr marL="285750" indent="-285750">
-              <a:buFont typeface="Arial" panose="020B0604020202020204" pitchFamily="34" charset="0"/>
-              <a:buChar char="•"/>
-            </a:pPr>
-            <a:r>
-              <a:rPr lang="en-US" dirty="0">
-                <a:hlinkClick r:id="rId4"/>
-              </a:rPr>
-              <a:t>https://www.flaticon.com/free-icons/spirit-level</a:t>
-            </a:r>
-            <a:r>
-              <a:rPr lang="en-US" dirty="0"/>
-              <a:t> : Spirit level icons created by </a:t>
-            </a:r>
-            <a:r>
-              <a:rPr lang="en-US" dirty="0" err="1"/>
-              <a:t>juicy_fish</a:t>
-            </a:r>
-            <a:r>
-              <a:rPr lang="en-US" dirty="0"/>
-              <a:t> - </a:t>
-            </a:r>
-            <a:r>
-              <a:rPr lang="en-US" dirty="0" err="1"/>
-              <a:t>Flaticon</a:t>
-            </a:r>
-            <a:endParaRPr lang="LID4096" dirty="0"/>
-          </a:p>
-        </p:txBody>
-      </p:sp>
+          <p:cNvGraphicFramePr>
+            <a:graphicFrameLocks noGrp="1"/>
+          </p:cNvGraphicFramePr>
+          <p:nvPr>
+            <p:extLst>
+              <p:ext uri="{D42A27DB-BD31-4B8C-83A1-F6EECF244321}">
+                <p14:modId xmlns:p14="http://schemas.microsoft.com/office/powerpoint/2010/main" val="3441314259"/>
+              </p:ext>
+            </p:extLst>
+          </p:nvPr>
+        </p:nvGraphicFramePr>
+        <p:xfrm>
+          <a:off x="1270001" y="1220925"/>
+          <a:ext cx="6096000" cy="2966720"/>
+        </p:xfrm>
+        <a:graphic>
+          <a:graphicData uri="http://schemas.openxmlformats.org/drawingml/2006/table">
+            <a:tbl>
+              <a:tblPr firstRow="1" bandRow="1">
+                <a:tableStyleId>{3C2FFA5D-87B4-456A-9821-1D502468CF0F}</a:tableStyleId>
+              </a:tblPr>
+              <a:tblGrid>
+                <a:gridCol w="3048000">
+                  <a:extLst>
+                    <a:ext uri="{9D8B030D-6E8A-4147-A177-3AD203B41FA5}">
+                      <a16:colId xmlns:a16="http://schemas.microsoft.com/office/drawing/2014/main" val="3372226300"/>
+                    </a:ext>
+                  </a:extLst>
+                </a:gridCol>
+                <a:gridCol w="3048000">
+                  <a:extLst>
+                    <a:ext uri="{9D8B030D-6E8A-4147-A177-3AD203B41FA5}">
+                      <a16:colId xmlns:a16="http://schemas.microsoft.com/office/drawing/2014/main" val="4221096465"/>
+                    </a:ext>
+                  </a:extLst>
+                </a:gridCol>
+              </a:tblGrid>
+              <a:tr h="370840">
+                <a:tc>
+                  <a:txBody>
+                    <a:bodyPr/>
+                    <a:lstStyle/>
+                    <a:p>
+                      <a:r>
+                        <a:rPr lang="en-US" dirty="0"/>
+                        <a:t>Component</a:t>
+                      </a:r>
+                    </a:p>
+                  </a:txBody>
+                  <a:tcPr/>
+                </a:tc>
+                <a:tc>
+                  <a:txBody>
+                    <a:bodyPr/>
+                    <a:lstStyle/>
+                    <a:p>
+                      <a:r>
+                        <a:rPr lang="en-US" dirty="0"/>
+                        <a:t>Price Estimate [EUR]</a:t>
+                      </a:r>
+                    </a:p>
+                  </a:txBody>
+                  <a:tcPr/>
+                </a:tc>
+                <a:extLst>
+                  <a:ext uri="{0D108BD9-81ED-4DB2-BD59-A6C34878D82A}">
+                    <a16:rowId xmlns:a16="http://schemas.microsoft.com/office/drawing/2014/main" val="1159753766"/>
+                  </a:ext>
+                </a:extLst>
+              </a:tr>
+              <a:tr h="370840">
+                <a:tc>
+                  <a:txBody>
+                    <a:bodyPr/>
+                    <a:lstStyle/>
+                    <a:p>
+                      <a:pPr marL="0" indent="0">
+                        <a:buFont typeface="Arial" panose="020B0604020202020204" pitchFamily="34" charset="0"/>
+                        <a:buNone/>
+                      </a:pPr>
+                      <a:r>
+                        <a:rPr lang="en-US" dirty="0"/>
+                        <a:t>Weight Sensor</a:t>
+                      </a:r>
+                    </a:p>
+                  </a:txBody>
+                  <a:tcPr/>
+                </a:tc>
+                <a:tc>
+                  <a:txBody>
+                    <a:bodyPr/>
+                    <a:lstStyle/>
+                    <a:p>
+                      <a:r>
+                        <a:rPr lang="en-US" dirty="0"/>
+                        <a:t>8.00</a:t>
+                      </a:r>
+                    </a:p>
+                  </a:txBody>
+                  <a:tcPr/>
+                </a:tc>
+                <a:extLst>
+                  <a:ext uri="{0D108BD9-81ED-4DB2-BD59-A6C34878D82A}">
+                    <a16:rowId xmlns:a16="http://schemas.microsoft.com/office/drawing/2014/main" val="2408203702"/>
+                  </a:ext>
+                </a:extLst>
+              </a:tr>
+              <a:tr h="370840">
+                <a:tc>
+                  <a:txBody>
+                    <a:bodyPr/>
+                    <a:lstStyle/>
+                    <a:p>
+                      <a:pPr marL="0" indent="0">
+                        <a:buFont typeface="Arial" panose="020B0604020202020204" pitchFamily="34" charset="0"/>
+                        <a:buNone/>
+                      </a:pPr>
+                      <a:r>
+                        <a:rPr lang="en-US" dirty="0"/>
+                        <a:t>Digital Tilt Sensor</a:t>
+                      </a:r>
+                    </a:p>
+                  </a:txBody>
+                  <a:tcPr/>
+                </a:tc>
+                <a:tc>
+                  <a:txBody>
+                    <a:bodyPr/>
+                    <a:lstStyle/>
+                    <a:p>
+                      <a:r>
+                        <a:rPr lang="en-US" dirty="0"/>
+                        <a:t>3.00</a:t>
+                      </a:r>
+                    </a:p>
+                  </a:txBody>
+                  <a:tcPr/>
+                </a:tc>
+                <a:extLst>
+                  <a:ext uri="{0D108BD9-81ED-4DB2-BD59-A6C34878D82A}">
+                    <a16:rowId xmlns:a16="http://schemas.microsoft.com/office/drawing/2014/main" val="4155050488"/>
+                  </a:ext>
+                </a:extLst>
+              </a:tr>
+              <a:tr h="370840">
+                <a:tc>
+                  <a:txBody>
+                    <a:bodyPr/>
+                    <a:lstStyle/>
+                    <a:p>
+                      <a:pPr marL="0" indent="0">
+                        <a:buFont typeface="Arial" panose="020B0604020202020204" pitchFamily="34" charset="0"/>
+                        <a:buNone/>
+                      </a:pPr>
+                      <a:r>
+                        <a:rPr lang="en-US" dirty="0"/>
+                        <a:t>ESP 32 + LoRa Module + Antenna</a:t>
+                      </a:r>
+                    </a:p>
+                  </a:txBody>
+                  <a:tcPr/>
+                </a:tc>
+                <a:tc>
+                  <a:txBody>
+                    <a:bodyPr/>
+                    <a:lstStyle/>
+                    <a:p>
+                      <a:r>
+                        <a:rPr lang="en-US" dirty="0"/>
+                        <a:t>15.00</a:t>
+                      </a:r>
+                    </a:p>
+                  </a:txBody>
+                  <a:tcPr/>
+                </a:tc>
+                <a:extLst>
+                  <a:ext uri="{0D108BD9-81ED-4DB2-BD59-A6C34878D82A}">
+                    <a16:rowId xmlns:a16="http://schemas.microsoft.com/office/drawing/2014/main" val="18599366"/>
+                  </a:ext>
+                </a:extLst>
+              </a:tr>
+              <a:tr h="370840">
+                <a:tc>
+                  <a:txBody>
+                    <a:bodyPr/>
+                    <a:lstStyle/>
+                    <a:p>
+                      <a:pPr marL="0" marR="0" lvl="0" indent="0" algn="l" defTabSz="914400" rtl="0" eaLnBrk="1" fontAlgn="auto" latinLnBrk="0" hangingPunct="1">
+                        <a:lnSpc>
+                          <a:spcPct val="100000"/>
+                        </a:lnSpc>
+                        <a:spcBef>
+                          <a:spcPts val="0"/>
+                        </a:spcBef>
+                        <a:spcAft>
+                          <a:spcPts val="0"/>
+                        </a:spcAft>
+                        <a:buClr>
+                          <a:srgbClr val="000000"/>
+                        </a:buClr>
+                        <a:buSzTx/>
+                        <a:buFont typeface="Arial"/>
+                        <a:buNone/>
+                        <a:tabLst/>
+                        <a:defRPr/>
+                      </a:pPr>
+                      <a:r>
+                        <a:rPr lang="en-US" dirty="0"/>
+                        <a:t>LDR</a:t>
+                      </a:r>
+                    </a:p>
+                  </a:txBody>
+                  <a:tcPr/>
+                </a:tc>
+                <a:tc>
+                  <a:txBody>
+                    <a:bodyPr/>
+                    <a:lstStyle/>
+                    <a:p>
+                      <a:r>
+                        <a:rPr lang="en-US" dirty="0"/>
+                        <a:t>1.00</a:t>
+                      </a:r>
+                    </a:p>
+                  </a:txBody>
+                  <a:tcPr/>
+                </a:tc>
+                <a:extLst>
+                  <a:ext uri="{0D108BD9-81ED-4DB2-BD59-A6C34878D82A}">
+                    <a16:rowId xmlns:a16="http://schemas.microsoft.com/office/drawing/2014/main" val="3319675552"/>
+                  </a:ext>
+                </a:extLst>
+              </a:tr>
+              <a:tr h="370840">
+                <a:tc>
+                  <a:txBody>
+                    <a:bodyPr/>
+                    <a:lstStyle/>
+                    <a:p>
+                      <a:pPr marL="0" marR="0" lvl="0" indent="0" algn="l" defTabSz="914400" rtl="0" eaLnBrk="1" fontAlgn="auto" latinLnBrk="0" hangingPunct="1">
+                        <a:lnSpc>
+                          <a:spcPct val="100000"/>
+                        </a:lnSpc>
+                        <a:spcBef>
+                          <a:spcPts val="0"/>
+                        </a:spcBef>
+                        <a:spcAft>
+                          <a:spcPts val="0"/>
+                        </a:spcAft>
+                        <a:buClr>
+                          <a:srgbClr val="000000"/>
+                        </a:buClr>
+                        <a:buSzTx/>
+                        <a:buFont typeface="Arial"/>
+                        <a:buNone/>
+                        <a:tabLst/>
+                        <a:defRPr/>
+                      </a:pPr>
+                      <a:r>
+                        <a:rPr lang="en-US" dirty="0"/>
+                        <a:t>Battery</a:t>
+                      </a:r>
+                    </a:p>
+                  </a:txBody>
+                  <a:tcPr/>
+                </a:tc>
+                <a:tc>
+                  <a:txBody>
+                    <a:bodyPr/>
+                    <a:lstStyle/>
+                    <a:p>
+                      <a:r>
+                        <a:rPr lang="en-US" dirty="0"/>
+                        <a:t>9.00</a:t>
+                      </a:r>
+                    </a:p>
+                  </a:txBody>
+                  <a:tcPr/>
+                </a:tc>
+                <a:extLst>
+                  <a:ext uri="{0D108BD9-81ED-4DB2-BD59-A6C34878D82A}">
+                    <a16:rowId xmlns:a16="http://schemas.microsoft.com/office/drawing/2014/main" val="2657914201"/>
+                  </a:ext>
+                </a:extLst>
+              </a:tr>
+              <a:tr h="370840">
+                <a:tc>
+                  <a:txBody>
+                    <a:bodyPr/>
+                    <a:lstStyle/>
+                    <a:p>
+                      <a:pPr marL="0" marR="0" lvl="0" indent="0" algn="l" defTabSz="914400" rtl="0" eaLnBrk="1" fontAlgn="auto" latinLnBrk="0" hangingPunct="1">
+                        <a:lnSpc>
+                          <a:spcPct val="100000"/>
+                        </a:lnSpc>
+                        <a:spcBef>
+                          <a:spcPts val="0"/>
+                        </a:spcBef>
+                        <a:spcAft>
+                          <a:spcPts val="0"/>
+                        </a:spcAft>
+                        <a:buClr>
+                          <a:srgbClr val="000000"/>
+                        </a:buClr>
+                        <a:buSzTx/>
+                        <a:buFont typeface="Arial"/>
+                        <a:buNone/>
+                        <a:tabLst/>
+                        <a:defRPr/>
+                      </a:pPr>
+                      <a:r>
+                        <a:rPr lang="en-US" dirty="0"/>
+                        <a:t>Housing estimate (extreme case)</a:t>
+                      </a:r>
+                    </a:p>
+                  </a:txBody>
+                  <a:tcPr>
+                    <a:lnB w="38100" cap="flat" cmpd="sng" algn="ctr">
+                      <a:solidFill>
+                        <a:schemeClr val="tx1"/>
+                      </a:solidFill>
+                      <a:prstDash val="solid"/>
+                      <a:round/>
+                      <a:headEnd type="none" w="med" len="med"/>
+                      <a:tailEnd type="none" w="med" len="med"/>
+                    </a:lnB>
+                  </a:tcPr>
+                </a:tc>
+                <a:tc>
+                  <a:txBody>
+                    <a:bodyPr/>
+                    <a:lstStyle/>
+                    <a:p>
+                      <a:r>
+                        <a:rPr lang="en-US" dirty="0"/>
+                        <a:t>20.00</a:t>
+                      </a:r>
+                    </a:p>
+                  </a:txBody>
+                  <a:tcPr>
+                    <a:lnB w="38100" cap="flat" cmpd="sng" algn="ctr">
+                      <a:solidFill>
+                        <a:schemeClr val="tx1"/>
+                      </a:solidFill>
+                      <a:prstDash val="solid"/>
+                      <a:round/>
+                      <a:headEnd type="none" w="med" len="med"/>
+                      <a:tailEnd type="none" w="med" len="med"/>
+                    </a:lnB>
+                  </a:tcPr>
+                </a:tc>
+                <a:extLst>
+                  <a:ext uri="{0D108BD9-81ED-4DB2-BD59-A6C34878D82A}">
+                    <a16:rowId xmlns:a16="http://schemas.microsoft.com/office/drawing/2014/main" val="2068639315"/>
+                  </a:ext>
+                </a:extLst>
+              </a:tr>
+              <a:tr h="370840">
+                <a:tc>
+                  <a:txBody>
+                    <a:bodyPr/>
+                    <a:lstStyle/>
+                    <a:p>
+                      <a:pPr marL="0" marR="0" lvl="0" indent="0" algn="l" defTabSz="914400" rtl="0" eaLnBrk="1" fontAlgn="auto" latinLnBrk="0" hangingPunct="1">
+                        <a:lnSpc>
+                          <a:spcPct val="100000"/>
+                        </a:lnSpc>
+                        <a:spcBef>
+                          <a:spcPts val="0"/>
+                        </a:spcBef>
+                        <a:spcAft>
+                          <a:spcPts val="0"/>
+                        </a:spcAft>
+                        <a:buClr>
+                          <a:srgbClr val="000000"/>
+                        </a:buClr>
+                        <a:buSzTx/>
+                        <a:buFont typeface="Arial"/>
+                        <a:buNone/>
+                        <a:tabLst/>
+                        <a:defRPr/>
+                      </a:pPr>
+                      <a:r>
+                        <a:rPr lang="en-US" b="1" dirty="0"/>
+                        <a:t>Total </a:t>
+                      </a:r>
+                    </a:p>
+                  </a:txBody>
+                  <a:tcPr>
+                    <a:lnT w="38100" cap="flat" cmpd="sng" algn="ctr">
+                      <a:solidFill>
+                        <a:schemeClr val="tx1"/>
+                      </a:solidFill>
+                      <a:prstDash val="solid"/>
+                      <a:round/>
+                      <a:headEnd type="none" w="med" len="med"/>
+                      <a:tailEnd type="none" w="med" len="med"/>
+                    </a:lnT>
+                  </a:tcPr>
+                </a:tc>
+                <a:tc>
+                  <a:txBody>
+                    <a:bodyPr/>
+                    <a:lstStyle/>
+                    <a:p>
+                      <a:r>
+                        <a:rPr lang="en-US" b="1" dirty="0"/>
+                        <a:t>55</a:t>
+                      </a:r>
+                    </a:p>
+                  </a:txBody>
+                  <a:tcPr>
+                    <a:lnT w="38100" cap="flat" cmpd="sng" algn="ctr">
+                      <a:solidFill>
+                        <a:schemeClr val="tx1"/>
+                      </a:solidFill>
+                      <a:prstDash val="solid"/>
+                      <a:round/>
+                      <a:headEnd type="none" w="med" len="med"/>
+                      <a:tailEnd type="none" w="med" len="med"/>
+                    </a:lnT>
+                  </a:tcPr>
+                </a:tc>
+                <a:extLst>
+                  <a:ext uri="{0D108BD9-81ED-4DB2-BD59-A6C34878D82A}">
+                    <a16:rowId xmlns:a16="http://schemas.microsoft.com/office/drawing/2014/main" val="4114245188"/>
+                  </a:ext>
+                </a:extLst>
+              </a:tr>
+            </a:tbl>
+          </a:graphicData>
+        </a:graphic>
+      </p:graphicFrame>
     </p:spTree>
     <p:extLst>
       <p:ext uri="{BB962C8B-B14F-4D97-AF65-F5344CB8AC3E}">
-        <p14:creationId xmlns:p14="http://schemas.microsoft.com/office/powerpoint/2010/main" val="2045045057"/>
+        <p14:creationId xmlns:p14="http://schemas.microsoft.com/office/powerpoint/2010/main" val="981409818"/>
       </p:ext>
     </p:extLst>
   </p:cSld>

</xml_diff>

<commit_message>
Small tweaks to pitch
</commit_message>
<xml_diff>
--- a/A.1 Pitch Presentation/The_Talking_Mailbox_Pitch.pptx
+++ b/A.1 Pitch Presentation/The_Talking_Mailbox_Pitch.pptx
@@ -300,21 +300,12 @@
 </p:presentation>
 </file>
 
-<file path=ppt/revisionInfo.xml><?xml version="1.0" encoding="utf-8"?>
-<p1510:revInfo xmlns:a="http://schemas.openxmlformats.org/drawingml/2006/main" xmlns:r="http://schemas.openxmlformats.org/officeDocument/2006/relationships" xmlns:p1510="http://schemas.microsoft.com/office/powerpoint/2015/10/main">
-  <p1510:revLst>
-    <p1510:client id="{27F63929-068E-4D52-942E-B3041DBA2BC1}" v="43" dt="2025-10-21T12:56:02.147"/>
-    <p1510:client id="{A947738B-BDFF-4532-8311-674A61BFA10C}" v="65" dt="2025-10-21T09:21:50.365"/>
-  </p1510:revLst>
-</p1510:revInfo>
-</file>
-
 <file path=ppt/changesInfos/changesInfo1.xml><?xml version="1.0" encoding="utf-8"?>
 <pc:chgInfo xmlns:a="http://schemas.openxmlformats.org/drawingml/2006/main" xmlns:r="http://schemas.openxmlformats.org/officeDocument/2006/relationships" xmlns:ac="http://schemas.microsoft.com/office/drawing/2013/main/command" xmlns:pc="http://schemas.microsoft.com/office/powerpoint/2013/main/command">
   <pc:docChgLst>
     <pc:chgData name="Abhinav Kothari" userId="2ad1c0a53281c2ab" providerId="LiveId" clId="{D6A6F71D-D2D6-4C8C-B265-23E5D4AFE2B6}"/>
     <pc:docChg chg="undo custSel addSld delSld modSld delMainMaster">
-      <pc:chgData name="Abhinav Kothari" userId="2ad1c0a53281c2ab" providerId="LiveId" clId="{D6A6F71D-D2D6-4C8C-B265-23E5D4AFE2B6}" dt="2025-10-21T13:04:13.351" v="3756" actId="20577"/>
+      <pc:chgData name="Abhinav Kothari" userId="2ad1c0a53281c2ab" providerId="LiveId" clId="{D6A6F71D-D2D6-4C8C-B265-23E5D4AFE2B6}" dt="2025-11-10T23:34:45.736" v="3863" actId="33524"/>
       <pc:docMkLst>
         <pc:docMk/>
       </pc:docMkLst>
@@ -348,14 +339,6 @@
             <ac:spMk id="225" creationId="{00000000-0000-0000-0000-000000000000}"/>
           </ac:spMkLst>
         </pc:spChg>
-        <pc:picChg chg="add del mod">
-          <ac:chgData name="Abhinav Kothari" userId="2ad1c0a53281c2ab" providerId="LiveId" clId="{D6A6F71D-D2D6-4C8C-B265-23E5D4AFE2B6}" dt="2025-10-21T09:27:09.809" v="1086" actId="21"/>
-          <ac:picMkLst>
-            <pc:docMk/>
-            <pc:sldMk cId="0" sldId="256"/>
-            <ac:picMk id="3" creationId="{E4CC330F-EB35-9B8A-E7AD-F880F8FE4638}"/>
-          </ac:picMkLst>
-        </pc:picChg>
         <pc:picChg chg="mod">
           <ac:chgData name="Abhinav Kothari" userId="2ad1c0a53281c2ab" providerId="LiveId" clId="{D6A6F71D-D2D6-4C8C-B265-23E5D4AFE2B6}" dt="2025-10-21T09:27:17.595" v="1088" actId="207"/>
           <ac:picMkLst>
@@ -366,27 +349,19 @@
         </pc:picChg>
       </pc:sldChg>
       <pc:sldChg chg="addSp delSp modSp mod modTransition">
-        <pc:chgData name="Abhinav Kothari" userId="2ad1c0a53281c2ab" providerId="LiveId" clId="{D6A6F71D-D2D6-4C8C-B265-23E5D4AFE2B6}" dt="2025-10-21T09:34:19.284" v="1802" actId="33524"/>
+        <pc:chgData name="Abhinav Kothari" userId="2ad1c0a53281c2ab" providerId="LiveId" clId="{D6A6F71D-D2D6-4C8C-B265-23E5D4AFE2B6}" dt="2025-11-10T23:34:45.736" v="3863" actId="33524"/>
         <pc:sldMkLst>
           <pc:docMk/>
           <pc:sldMk cId="0" sldId="259"/>
         </pc:sldMkLst>
         <pc:spChg chg="mod">
-          <ac:chgData name="Abhinav Kothari" userId="2ad1c0a53281c2ab" providerId="LiveId" clId="{D6A6F71D-D2D6-4C8C-B265-23E5D4AFE2B6}" dt="2025-10-21T09:34:19.284" v="1802" actId="33524"/>
+          <ac:chgData name="Abhinav Kothari" userId="2ad1c0a53281c2ab" providerId="LiveId" clId="{D6A6F71D-D2D6-4C8C-B265-23E5D4AFE2B6}" dt="2025-11-10T23:34:45.736" v="3863" actId="33524"/>
           <ac:spMkLst>
             <pc:docMk/>
             <pc:sldMk cId="0" sldId="259"/>
             <ac:spMk id="264" creationId="{00000000-0000-0000-0000-000000000000}"/>
           </ac:spMkLst>
         </pc:spChg>
-        <pc:picChg chg="add del mod">
-          <ac:chgData name="Abhinav Kothari" userId="2ad1c0a53281c2ab" providerId="LiveId" clId="{D6A6F71D-D2D6-4C8C-B265-23E5D4AFE2B6}" dt="2025-10-21T08:01:40.931" v="2" actId="21"/>
-          <ac:picMkLst>
-            <pc:docMk/>
-            <pc:sldMk cId="0" sldId="259"/>
-            <ac:picMk id="3" creationId="{7EE6BF25-F5FA-BFD0-FD82-79A90A8C0035}"/>
-          </ac:picMkLst>
-        </pc:picChg>
         <pc:picChg chg="mod">
           <ac:chgData name="Abhinav Kothari" userId="2ad1c0a53281c2ab" providerId="LiveId" clId="{D6A6F71D-D2D6-4C8C-B265-23E5D4AFE2B6}" dt="2025-10-21T08:01:52.001" v="4" actId="207"/>
           <ac:picMkLst>
@@ -458,46 +433,6 @@
             <ac:spMk id="296" creationId="{00000000-0000-0000-0000-000000000000}"/>
           </ac:spMkLst>
         </pc:spChg>
-        <pc:grpChg chg="del">
-          <ac:chgData name="Abhinav Kothari" userId="2ad1c0a53281c2ab" providerId="LiveId" clId="{D6A6F71D-D2D6-4C8C-B265-23E5D4AFE2B6}" dt="2025-10-21T08:06:51.164" v="57" actId="478"/>
-          <ac:grpSpMkLst>
-            <pc:docMk/>
-            <pc:sldMk cId="0" sldId="262"/>
-            <ac:grpSpMk id="297" creationId="{00000000-0000-0000-0000-000000000000}"/>
-          </ac:grpSpMkLst>
-        </pc:grpChg>
-        <pc:grpChg chg="del">
-          <ac:chgData name="Abhinav Kothari" userId="2ad1c0a53281c2ab" providerId="LiveId" clId="{D6A6F71D-D2D6-4C8C-B265-23E5D4AFE2B6}" dt="2025-10-21T08:05:22.052" v="45" actId="478"/>
-          <ac:grpSpMkLst>
-            <pc:docMk/>
-            <pc:sldMk cId="0" sldId="262"/>
-            <ac:grpSpMk id="300" creationId="{00000000-0000-0000-0000-000000000000}"/>
-          </ac:grpSpMkLst>
-        </pc:grpChg>
-        <pc:grpChg chg="del">
-          <ac:chgData name="Abhinav Kothari" userId="2ad1c0a53281c2ab" providerId="LiveId" clId="{D6A6F71D-D2D6-4C8C-B265-23E5D4AFE2B6}" dt="2025-10-21T08:04:19.845" v="34" actId="478"/>
-          <ac:grpSpMkLst>
-            <pc:docMk/>
-            <pc:sldMk cId="0" sldId="262"/>
-            <ac:grpSpMk id="305" creationId="{00000000-0000-0000-0000-000000000000}"/>
-          </ac:grpSpMkLst>
-        </pc:grpChg>
-        <pc:picChg chg="add del mod">
-          <ac:chgData name="Abhinav Kothari" userId="2ad1c0a53281c2ab" providerId="LiveId" clId="{D6A6F71D-D2D6-4C8C-B265-23E5D4AFE2B6}" dt="2025-10-21T08:03:46.472" v="27" actId="21"/>
-          <ac:picMkLst>
-            <pc:docMk/>
-            <pc:sldMk cId="0" sldId="262"/>
-            <ac:picMk id="3" creationId="{3A5B6F97-9D8F-7D80-A877-8768546FF175}"/>
-          </ac:picMkLst>
-        </pc:picChg>
-        <pc:picChg chg="add del mod">
-          <ac:chgData name="Abhinav Kothari" userId="2ad1c0a53281c2ab" providerId="LiveId" clId="{D6A6F71D-D2D6-4C8C-B265-23E5D4AFE2B6}" dt="2025-10-21T09:31:37.809" v="1447" actId="21"/>
-          <ac:picMkLst>
-            <pc:docMk/>
-            <pc:sldMk cId="0" sldId="262"/>
-            <ac:picMk id="3" creationId="{D53C4086-2F73-2A81-0316-15AFF6A57E2E}"/>
-          </ac:picMkLst>
-        </pc:picChg>
         <pc:picChg chg="add mod ord">
           <ac:chgData name="Abhinav Kothari" userId="2ad1c0a53281c2ab" providerId="LiveId" clId="{D6A6F71D-D2D6-4C8C-B265-23E5D4AFE2B6}" dt="2025-10-21T09:31:40.409" v="1448" actId="14826"/>
           <ac:picMkLst>
@@ -514,14 +449,6 @@
             <ac:picMk id="6" creationId="{DD712D33-2FAE-A058-981A-EBC0246ADB3B}"/>
           </ac:picMkLst>
         </pc:picChg>
-        <pc:picChg chg="add del mod">
-          <ac:chgData name="Abhinav Kothari" userId="2ad1c0a53281c2ab" providerId="LiveId" clId="{D6A6F71D-D2D6-4C8C-B265-23E5D4AFE2B6}" dt="2025-10-21T09:39:09.083" v="1852" actId="21"/>
-          <ac:picMkLst>
-            <pc:docMk/>
-            <pc:sldMk cId="0" sldId="262"/>
-            <ac:picMk id="7" creationId="{8A10B493-AD4B-FA36-E0E4-384172C87121}"/>
-          </ac:picMkLst>
-        </pc:picChg>
         <pc:picChg chg="add mod ord">
           <ac:chgData name="Abhinav Kothari" userId="2ad1c0a53281c2ab" providerId="LiveId" clId="{D6A6F71D-D2D6-4C8C-B265-23E5D4AFE2B6}" dt="2025-10-21T09:38:19.375" v="1844" actId="14826"/>
           <ac:picMkLst>
@@ -530,21 +457,6 @@
             <ac:picMk id="8" creationId="{1CAE8B01-0587-2F84-C754-6C034A314F77}"/>
           </ac:picMkLst>
         </pc:picChg>
-        <pc:picChg chg="add del mod">
-          <ac:chgData name="Abhinav Kothari" userId="2ad1c0a53281c2ab" providerId="LiveId" clId="{D6A6F71D-D2D6-4C8C-B265-23E5D4AFE2B6}" dt="2025-10-21T08:07:15.160" v="63" actId="478"/>
-          <ac:picMkLst>
-            <pc:docMk/>
-            <pc:sldMk cId="0" sldId="262"/>
-            <ac:picMk id="10" creationId="{6DB14246-C851-7EEB-2005-B6409CF038CF}"/>
-          </ac:picMkLst>
-        </pc:picChg>
-      </pc:sldChg>
-      <pc:sldChg chg="del">
-        <pc:chgData name="Abhinav Kothari" userId="2ad1c0a53281c2ab" providerId="LiveId" clId="{D6A6F71D-D2D6-4C8C-B265-23E5D4AFE2B6}" dt="2025-10-21T08:08:53.914" v="64" actId="2696"/>
-        <pc:sldMkLst>
-          <pc:docMk/>
-          <pc:sldMk cId="0" sldId="263"/>
-        </pc:sldMkLst>
       </pc:sldChg>
       <pc:sldChg chg="addSp delSp modSp mod modTransition">
         <pc:chgData name="Abhinav Kothari" userId="2ad1c0a53281c2ab" providerId="LiveId" clId="{D6A6F71D-D2D6-4C8C-B265-23E5D4AFE2B6}" dt="2025-10-21T10:54:07.737" v="3062"/>
@@ -657,13 +569,6 @@
           </ac:cxnSpMkLst>
         </pc:cxnChg>
       </pc:sldChg>
-      <pc:sldChg chg="del">
-        <pc:chgData name="Abhinav Kothari" userId="2ad1c0a53281c2ab" providerId="LiveId" clId="{D6A6F71D-D2D6-4C8C-B265-23E5D4AFE2B6}" dt="2025-10-21T09:15:48.253" v="918" actId="47"/>
-        <pc:sldMkLst>
-          <pc:docMk/>
-          <pc:sldMk cId="0" sldId="268"/>
-        </pc:sldMkLst>
-      </pc:sldChg>
       <pc:sldChg chg="addSp delSp modSp mod modTransition">
         <pc:chgData name="Abhinav Kothari" userId="2ad1c0a53281c2ab" providerId="LiveId" clId="{D6A6F71D-D2D6-4C8C-B265-23E5D4AFE2B6}" dt="2025-10-21T13:03:13.793" v="3735" actId="20577"/>
         <pc:sldMkLst>
@@ -676,14 +581,6 @@
             <pc:docMk/>
             <pc:sldMk cId="0" sldId="269"/>
             <ac:spMk id="22" creationId="{CDEE880D-D077-7A2C-34E9-4D52923306B2}"/>
-          </ac:spMkLst>
-        </pc:spChg>
-        <pc:spChg chg="add del mod topLvl">
-          <ac:chgData name="Abhinav Kothari" userId="2ad1c0a53281c2ab" providerId="LiveId" clId="{D6A6F71D-D2D6-4C8C-B265-23E5D4AFE2B6}" dt="2025-10-21T10:01:53.183" v="2721" actId="478"/>
-          <ac:spMkLst>
-            <pc:docMk/>
-            <pc:sldMk cId="0" sldId="269"/>
-            <ac:spMk id="26" creationId="{B99FBC48-2A5D-E84A-EAD1-EB68C265085A}"/>
           </ac:spMkLst>
         </pc:spChg>
         <pc:spChg chg="add mod">
@@ -766,52 +663,12 @@
             <ac:grpSpMk id="12" creationId="{C5F66F20-691E-929A-3FD8-01F50D5CE5AC}"/>
           </ac:grpSpMkLst>
         </pc:grpChg>
-        <pc:grpChg chg="add del mod">
-          <ac:chgData name="Abhinav Kothari" userId="2ad1c0a53281c2ab" providerId="LiveId" clId="{D6A6F71D-D2D6-4C8C-B265-23E5D4AFE2B6}" dt="2025-10-21T09:52:09.350" v="2621" actId="165"/>
-          <ac:grpSpMkLst>
-            <pc:docMk/>
-            <pc:sldMk cId="0" sldId="269"/>
-            <ac:grpSpMk id="14" creationId="{9681E682-E490-7F81-C17F-261C78D04397}"/>
-          </ac:grpSpMkLst>
-        </pc:grpChg>
         <pc:grpChg chg="add mod">
           <ac:chgData name="Abhinav Kothari" userId="2ad1c0a53281c2ab" providerId="LiveId" clId="{D6A6F71D-D2D6-4C8C-B265-23E5D4AFE2B6}" dt="2025-10-21T10:00:47.464" v="2701" actId="164"/>
           <ac:grpSpMkLst>
             <pc:docMk/>
             <pc:sldMk cId="0" sldId="269"/>
             <ac:grpSpMk id="15" creationId="{54F46F8C-11A9-AD60-35CA-3EDAA9E4091F}"/>
-          </ac:grpSpMkLst>
-        </pc:grpChg>
-        <pc:grpChg chg="add del mod">
-          <ac:chgData name="Abhinav Kothari" userId="2ad1c0a53281c2ab" providerId="LiveId" clId="{D6A6F71D-D2D6-4C8C-B265-23E5D4AFE2B6}" dt="2025-10-21T09:10:33.894" v="717" actId="165"/>
-          <ac:grpSpMkLst>
-            <pc:docMk/>
-            <pc:sldMk cId="0" sldId="269"/>
-            <ac:grpSpMk id="15" creationId="{B22FA364-7825-FF7F-550E-71DDDF636695}"/>
-          </ac:grpSpMkLst>
-        </pc:grpChg>
-        <pc:grpChg chg="add del mod">
-          <ac:chgData name="Abhinav Kothari" userId="2ad1c0a53281c2ab" providerId="LiveId" clId="{D6A6F71D-D2D6-4C8C-B265-23E5D4AFE2B6}" dt="2025-10-21T09:55:34.284" v="2662" actId="165"/>
-          <ac:grpSpMkLst>
-            <pc:docMk/>
-            <pc:sldMk cId="0" sldId="269"/>
-            <ac:grpSpMk id="16" creationId="{C616FB22-20DF-F516-3C5A-5FE2D22E95B7}"/>
-          </ac:grpSpMkLst>
-        </pc:grpChg>
-        <pc:grpChg chg="add del mod">
-          <ac:chgData name="Abhinav Kothari" userId="2ad1c0a53281c2ab" providerId="LiveId" clId="{D6A6F71D-D2D6-4C8C-B265-23E5D4AFE2B6}" dt="2025-10-21T09:10:26.644" v="715" actId="165"/>
-          <ac:grpSpMkLst>
-            <pc:docMk/>
-            <pc:sldMk cId="0" sldId="269"/>
-            <ac:grpSpMk id="17" creationId="{80F9DA09-6EA7-70E5-FE80-3BF23F74F6C8}"/>
-          </ac:grpSpMkLst>
-        </pc:grpChg>
-        <pc:grpChg chg="add del mod">
-          <ac:chgData name="Abhinav Kothari" userId="2ad1c0a53281c2ab" providerId="LiveId" clId="{D6A6F71D-D2D6-4C8C-B265-23E5D4AFE2B6}" dt="2025-10-21T10:00:22.617" v="2693" actId="165"/>
-          <ac:grpSpMkLst>
-            <pc:docMk/>
-            <pc:sldMk cId="0" sldId="269"/>
-            <ac:grpSpMk id="18" creationId="{65952B64-C9BD-749A-D86B-0E1E45CF9DAE}"/>
           </ac:grpSpMkLst>
         </pc:grpChg>
         <pc:grpChg chg="add mod">
@@ -822,44 +679,12 @@
             <ac:grpSpMk id="19" creationId="{A7918306-510D-8C60-314C-C2D58D1C7974}"/>
           </ac:grpSpMkLst>
         </pc:grpChg>
-        <pc:grpChg chg="add del mod">
-          <ac:chgData name="Abhinav Kothari" userId="2ad1c0a53281c2ab" providerId="LiveId" clId="{D6A6F71D-D2D6-4C8C-B265-23E5D4AFE2B6}" dt="2025-10-21T09:11:11.597" v="727" actId="165"/>
-          <ac:grpSpMkLst>
-            <pc:docMk/>
-            <pc:sldMk cId="0" sldId="269"/>
-            <ac:grpSpMk id="23" creationId="{69323AE9-AFF8-0870-FBD5-93619CD8BA37}"/>
-          </ac:grpSpMkLst>
-        </pc:grpChg>
-        <pc:grpChg chg="add del mod">
-          <ac:chgData name="Abhinav Kothari" userId="2ad1c0a53281c2ab" providerId="LiveId" clId="{D6A6F71D-D2D6-4C8C-B265-23E5D4AFE2B6}" dt="2025-10-21T09:08:06.211" v="689" actId="165"/>
-          <ac:grpSpMkLst>
-            <pc:docMk/>
-            <pc:sldMk cId="0" sldId="269"/>
-            <ac:grpSpMk id="27" creationId="{F338AC73-4524-81A8-1899-6327FAC2941B}"/>
-          </ac:grpSpMkLst>
-        </pc:grpChg>
-        <pc:grpChg chg="add del mod">
-          <ac:chgData name="Abhinav Kothari" userId="2ad1c0a53281c2ab" providerId="LiveId" clId="{D6A6F71D-D2D6-4C8C-B265-23E5D4AFE2B6}" dt="2025-10-21T10:01:47.193" v="2719" actId="21"/>
-          <ac:grpSpMkLst>
-            <pc:docMk/>
-            <pc:sldMk cId="0" sldId="269"/>
-            <ac:grpSpMk id="28" creationId="{12CFDF8E-887D-04BD-8BAC-8502EE06B3A6}"/>
-          </ac:grpSpMkLst>
-        </pc:grpChg>
         <pc:grpChg chg="add mod">
           <ac:chgData name="Abhinav Kothari" userId="2ad1c0a53281c2ab" providerId="LiveId" clId="{D6A6F71D-D2D6-4C8C-B265-23E5D4AFE2B6}" dt="2025-10-21T09:10:41.450" v="719" actId="164"/>
           <ac:grpSpMkLst>
             <pc:docMk/>
             <pc:sldMk cId="0" sldId="269"/>
             <ac:grpSpMk id="42" creationId="{56C60C72-E4FD-574E-F13A-8524968E78A6}"/>
-          </ac:grpSpMkLst>
-        </pc:grpChg>
-        <pc:grpChg chg="add del mod">
-          <ac:chgData name="Abhinav Kothari" userId="2ad1c0a53281c2ab" providerId="LiveId" clId="{D6A6F71D-D2D6-4C8C-B265-23E5D4AFE2B6}" dt="2025-10-21T09:10:47.423" v="721" actId="165"/>
-          <ac:grpSpMkLst>
-            <pc:docMk/>
-            <pc:sldMk cId="0" sldId="269"/>
-            <ac:grpSpMk id="43" creationId="{023112DD-4308-6362-813F-822232496827}"/>
           </ac:grpSpMkLst>
         </pc:grpChg>
         <pc:grpChg chg="add mod">
@@ -878,68 +703,12 @@
             <ac:grpSpMk id="50" creationId="{DFED5D74-E0B6-0BCE-7AFB-2327728E7991}"/>
           </ac:grpSpMkLst>
         </pc:grpChg>
-        <pc:grpChg chg="del">
-          <ac:chgData name="Abhinav Kothari" userId="2ad1c0a53281c2ab" providerId="LiveId" clId="{D6A6F71D-D2D6-4C8C-B265-23E5D4AFE2B6}" dt="2025-10-21T09:02:11.616" v="541" actId="478"/>
-          <ac:grpSpMkLst>
-            <pc:docMk/>
-            <pc:sldMk cId="0" sldId="269"/>
-            <ac:grpSpMk id="442" creationId="{00000000-0000-0000-0000-000000000000}"/>
-          </ac:grpSpMkLst>
-        </pc:grpChg>
         <pc:grpChg chg="add mod">
           <ac:chgData name="Abhinav Kothari" userId="2ad1c0a53281c2ab" providerId="LiveId" clId="{D6A6F71D-D2D6-4C8C-B265-23E5D4AFE2B6}" dt="2025-10-21T10:02:00.305" v="2723" actId="1076"/>
           <ac:grpSpMkLst>
             <pc:docMk/>
             <pc:sldMk cId="0" sldId="269"/>
             <ac:grpSpMk id="452" creationId="{2F83C457-8DD5-4762-4EFB-599CE8156F45}"/>
-          </ac:grpSpMkLst>
-        </pc:grpChg>
-        <pc:grpChg chg="del">
-          <ac:chgData name="Abhinav Kothari" userId="2ad1c0a53281c2ab" providerId="LiveId" clId="{D6A6F71D-D2D6-4C8C-B265-23E5D4AFE2B6}" dt="2025-10-21T08:43:53.537" v="526" actId="478"/>
-          <ac:grpSpMkLst>
-            <pc:docMk/>
-            <pc:sldMk cId="0" sldId="269"/>
-            <ac:grpSpMk id="459" creationId="{00000000-0000-0000-0000-000000000000}"/>
-          </ac:grpSpMkLst>
-        </pc:grpChg>
-        <pc:grpChg chg="del">
-          <ac:chgData name="Abhinav Kothari" userId="2ad1c0a53281c2ab" providerId="LiveId" clId="{D6A6F71D-D2D6-4C8C-B265-23E5D4AFE2B6}" dt="2025-10-21T08:43:02.542" v="520" actId="478"/>
-          <ac:grpSpMkLst>
-            <pc:docMk/>
-            <pc:sldMk cId="0" sldId="269"/>
-            <ac:grpSpMk id="464" creationId="{00000000-0000-0000-0000-000000000000}"/>
-          </ac:grpSpMkLst>
-        </pc:grpChg>
-        <pc:grpChg chg="del">
-          <ac:chgData name="Abhinav Kothari" userId="2ad1c0a53281c2ab" providerId="LiveId" clId="{D6A6F71D-D2D6-4C8C-B265-23E5D4AFE2B6}" dt="2025-10-21T08:42:11.480" v="512" actId="478"/>
-          <ac:grpSpMkLst>
-            <pc:docMk/>
-            <pc:sldMk cId="0" sldId="269"/>
-            <ac:grpSpMk id="468" creationId="{00000000-0000-0000-0000-000000000000}"/>
-          </ac:grpSpMkLst>
-        </pc:grpChg>
-        <pc:grpChg chg="del">
-          <ac:chgData name="Abhinav Kothari" userId="2ad1c0a53281c2ab" providerId="LiveId" clId="{D6A6F71D-D2D6-4C8C-B265-23E5D4AFE2B6}" dt="2025-10-21T08:44:17.221" v="532" actId="478"/>
-          <ac:grpSpMkLst>
-            <pc:docMk/>
-            <pc:sldMk cId="0" sldId="269"/>
-            <ac:grpSpMk id="471" creationId="{00000000-0000-0000-0000-000000000000}"/>
-          </ac:grpSpMkLst>
-        </pc:grpChg>
-        <pc:grpChg chg="del">
-          <ac:chgData name="Abhinav Kothari" userId="2ad1c0a53281c2ab" providerId="LiveId" clId="{D6A6F71D-D2D6-4C8C-B265-23E5D4AFE2B6}" dt="2025-10-21T08:37:59.795" v="364" actId="478"/>
-          <ac:grpSpMkLst>
-            <pc:docMk/>
-            <pc:sldMk cId="0" sldId="269"/>
-            <ac:grpSpMk id="474" creationId="{00000000-0000-0000-0000-000000000000}"/>
-          </ac:grpSpMkLst>
-        </pc:grpChg>
-        <pc:grpChg chg="del">
-          <ac:chgData name="Abhinav Kothari" userId="2ad1c0a53281c2ab" providerId="LiveId" clId="{D6A6F71D-D2D6-4C8C-B265-23E5D4AFE2B6}" dt="2025-10-21T08:33:30.170" v="353" actId="478"/>
-          <ac:grpSpMkLst>
-            <pc:docMk/>
-            <pc:sldMk cId="0" sldId="269"/>
-            <ac:grpSpMk id="477" creationId="{00000000-0000-0000-0000-000000000000}"/>
           </ac:grpSpMkLst>
         </pc:grpChg>
         <pc:picChg chg="add mod topLvl">
@@ -956,14 +725,6 @@
             <pc:docMk/>
             <pc:sldMk cId="0" sldId="269"/>
             <ac:picMk id="5" creationId="{29BDC342-EBE3-00D7-C8C7-549AE688CCA3}"/>
-          </ac:picMkLst>
-        </pc:picChg>
-        <pc:picChg chg="add del mod">
-          <ac:chgData name="Abhinav Kothari" userId="2ad1c0a53281c2ab" providerId="LiveId" clId="{D6A6F71D-D2D6-4C8C-B265-23E5D4AFE2B6}" dt="2025-10-21T09:53:39.697" v="2627" actId="21"/>
-          <ac:picMkLst>
-            <pc:docMk/>
-            <pc:sldMk cId="0" sldId="269"/>
-            <ac:picMk id="6" creationId="{E557C9D5-4924-55E5-B6B5-48B47CF9D54C}"/>
           </ac:picMkLst>
         </pc:picChg>
         <pc:picChg chg="add mod topLvl">
@@ -1006,22 +767,6 @@
             <ac:picMk id="21" creationId="{8DD36537-2431-A18A-9BF5-9E65385F22F5}"/>
           </ac:picMkLst>
         </pc:picChg>
-        <pc:picChg chg="add del mod topLvl">
-          <ac:chgData name="Abhinav Kothari" userId="2ad1c0a53281c2ab" providerId="LiveId" clId="{D6A6F71D-D2D6-4C8C-B265-23E5D4AFE2B6}" dt="2025-10-21T10:01:47.193" v="2719" actId="21"/>
-          <ac:picMkLst>
-            <pc:docMk/>
-            <pc:sldMk cId="0" sldId="269"/>
-            <ac:picMk id="25" creationId="{42D9FA80-097A-12BE-C6BB-96681F0ED4F1}"/>
-          </ac:picMkLst>
-        </pc:picChg>
-        <pc:picChg chg="del mod">
-          <ac:chgData name="Abhinav Kothari" userId="2ad1c0a53281c2ab" providerId="LiveId" clId="{D6A6F71D-D2D6-4C8C-B265-23E5D4AFE2B6}" dt="2025-10-21T09:02:10.725" v="540" actId="478"/>
-          <ac:picMkLst>
-            <pc:docMk/>
-            <pc:sldMk cId="0" sldId="269"/>
-            <ac:picMk id="458" creationId="{00000000-0000-0000-0000-000000000000}"/>
-          </ac:picMkLst>
-        </pc:picChg>
         <pc:cxnChg chg="add mod">
           <ac:chgData name="Abhinav Kothari" userId="2ad1c0a53281c2ab" providerId="LiveId" clId="{D6A6F71D-D2D6-4C8C-B265-23E5D4AFE2B6}" dt="2025-10-21T10:01:13.704" v="2709" actId="208"/>
           <ac:cxnSpMkLst>
@@ -1046,22 +791,6 @@
             <ac:cxnSpMk id="30" creationId="{F2F165B7-017F-8AA5-E0E0-9E09F16BECCE}"/>
           </ac:cxnSpMkLst>
         </pc:cxnChg>
-        <pc:cxnChg chg="add del mod">
-          <ac:chgData name="Abhinav Kothari" userId="2ad1c0a53281c2ab" providerId="LiveId" clId="{D6A6F71D-D2D6-4C8C-B265-23E5D4AFE2B6}" dt="2025-10-21T09:58:07.128" v="2666" actId="478"/>
-          <ac:cxnSpMkLst>
-            <pc:docMk/>
-            <pc:sldMk cId="0" sldId="269"/>
-            <ac:cxnSpMk id="33" creationId="{EDE5E9CC-86FC-7CFC-26C2-BC21B7054238}"/>
-          </ac:cxnSpMkLst>
-        </pc:cxnChg>
-        <pc:cxnChg chg="add del mod">
-          <ac:chgData name="Abhinav Kothari" userId="2ad1c0a53281c2ab" providerId="LiveId" clId="{D6A6F71D-D2D6-4C8C-B265-23E5D4AFE2B6}" dt="2025-10-21T10:00:11.993" v="2680" actId="478"/>
-          <ac:cxnSpMkLst>
-            <pc:docMk/>
-            <pc:sldMk cId="0" sldId="269"/>
-            <ac:cxnSpMk id="37" creationId="{592F64C3-0638-7E7C-4186-A8787B30ADDF}"/>
-          </ac:cxnSpMkLst>
-        </pc:cxnChg>
         <pc:cxnChg chg="add mod">
           <ac:chgData name="Abhinav Kothari" userId="2ad1c0a53281c2ab" providerId="LiveId" clId="{D6A6F71D-D2D6-4C8C-B265-23E5D4AFE2B6}" dt="2025-10-21T09:10:52.844" v="723" actId="1076"/>
           <ac:cxnSpMkLst>
@@ -1078,28 +807,12 @@
             <ac:cxnSpMk id="46" creationId="{8D63827E-4068-28D4-C7DF-499832576E51}"/>
           </ac:cxnSpMkLst>
         </pc:cxnChg>
-        <pc:cxnChg chg="add del mod">
-          <ac:chgData name="Abhinav Kothari" userId="2ad1c0a53281c2ab" providerId="LiveId" clId="{D6A6F71D-D2D6-4C8C-B265-23E5D4AFE2B6}" dt="2025-10-21T09:11:51.766" v="737" actId="11529"/>
-          <ac:cxnSpMkLst>
-            <pc:docMk/>
-            <pc:sldMk cId="0" sldId="269"/>
-            <ac:cxnSpMk id="52" creationId="{3754653C-461E-B6BA-24ED-9E2EA52B55F1}"/>
-          </ac:cxnSpMkLst>
-        </pc:cxnChg>
         <pc:cxnChg chg="add mod">
           <ac:chgData name="Abhinav Kothari" userId="2ad1c0a53281c2ab" providerId="LiveId" clId="{D6A6F71D-D2D6-4C8C-B265-23E5D4AFE2B6}" dt="2025-10-21T09:12:54.475" v="764" actId="208"/>
           <ac:cxnSpMkLst>
             <pc:docMk/>
             <pc:sldMk cId="0" sldId="269"/>
             <ac:cxnSpMk id="55" creationId="{07B837AD-E0A7-E486-611D-B6190CAD810F}"/>
-          </ac:cxnSpMkLst>
-        </pc:cxnChg>
-        <pc:cxnChg chg="add del mod">
-          <ac:chgData name="Abhinav Kothari" userId="2ad1c0a53281c2ab" providerId="LiveId" clId="{D6A6F71D-D2D6-4C8C-B265-23E5D4AFE2B6}" dt="2025-10-21T10:01:53.896" v="2722" actId="478"/>
-          <ac:cxnSpMkLst>
-            <pc:docMk/>
-            <pc:sldMk cId="0" sldId="269"/>
-            <ac:cxnSpMk id="58" creationId="{E56872CE-5AF3-CB26-AFD3-0E347BAAB0EC}"/>
           </ac:cxnSpMkLst>
         </pc:cxnChg>
         <pc:cxnChg chg="add mod">
@@ -1127,153 +840,6 @@
           </ac:cxnSpMkLst>
         </pc:cxnChg>
       </pc:sldChg>
-      <pc:sldChg chg="del">
-        <pc:chgData name="Abhinav Kothari" userId="2ad1c0a53281c2ab" providerId="LiveId" clId="{D6A6F71D-D2D6-4C8C-B265-23E5D4AFE2B6}" dt="2025-10-21T09:15:47.230" v="917" actId="47"/>
-        <pc:sldMkLst>
-          <pc:docMk/>
-          <pc:sldMk cId="0" sldId="276"/>
-        </pc:sldMkLst>
-      </pc:sldChg>
-      <pc:sldChg chg="del">
-        <pc:chgData name="Abhinav Kothari" userId="2ad1c0a53281c2ab" providerId="LiveId" clId="{D6A6F71D-D2D6-4C8C-B265-23E5D4AFE2B6}" dt="2025-10-21T09:15:46.226" v="916" actId="47"/>
-        <pc:sldMkLst>
-          <pc:docMk/>
-          <pc:sldMk cId="0" sldId="277"/>
-        </pc:sldMkLst>
-      </pc:sldChg>
-      <pc:sldChg chg="del">
-        <pc:chgData name="Abhinav Kothari" userId="2ad1c0a53281c2ab" providerId="LiveId" clId="{D6A6F71D-D2D6-4C8C-B265-23E5D4AFE2B6}" dt="2025-10-21T09:15:44.917" v="915" actId="47"/>
-        <pc:sldMkLst>
-          <pc:docMk/>
-          <pc:sldMk cId="0" sldId="278"/>
-        </pc:sldMkLst>
-      </pc:sldChg>
-      <pc:sldChg chg="del">
-        <pc:chgData name="Abhinav Kothari" userId="2ad1c0a53281c2ab" providerId="LiveId" clId="{D6A6F71D-D2D6-4C8C-B265-23E5D4AFE2B6}" dt="2025-10-21T09:15:38.698" v="908" actId="47"/>
-        <pc:sldMkLst>
-          <pc:docMk/>
-          <pc:sldMk cId="0" sldId="279"/>
-        </pc:sldMkLst>
-      </pc:sldChg>
-      <pc:sldChg chg="del">
-        <pc:chgData name="Abhinav Kothari" userId="2ad1c0a53281c2ab" providerId="LiveId" clId="{D6A6F71D-D2D6-4C8C-B265-23E5D4AFE2B6}" dt="2025-10-21T09:15:38.698" v="908" actId="47"/>
-        <pc:sldMkLst>
-          <pc:docMk/>
-          <pc:sldMk cId="0" sldId="280"/>
-        </pc:sldMkLst>
-      </pc:sldChg>
-      <pc:sldChg chg="del">
-        <pc:chgData name="Abhinav Kothari" userId="2ad1c0a53281c2ab" providerId="LiveId" clId="{D6A6F71D-D2D6-4C8C-B265-23E5D4AFE2B6}" dt="2025-10-21T09:15:38.698" v="908" actId="47"/>
-        <pc:sldMkLst>
-          <pc:docMk/>
-          <pc:sldMk cId="0" sldId="281"/>
-        </pc:sldMkLst>
-      </pc:sldChg>
-      <pc:sldChg chg="del">
-        <pc:chgData name="Abhinav Kothari" userId="2ad1c0a53281c2ab" providerId="LiveId" clId="{D6A6F71D-D2D6-4C8C-B265-23E5D4AFE2B6}" dt="2025-10-21T09:15:38.698" v="908" actId="47"/>
-        <pc:sldMkLst>
-          <pc:docMk/>
-          <pc:sldMk cId="0" sldId="282"/>
-        </pc:sldMkLst>
-      </pc:sldChg>
-      <pc:sldChg chg="del">
-        <pc:chgData name="Abhinav Kothari" userId="2ad1c0a53281c2ab" providerId="LiveId" clId="{D6A6F71D-D2D6-4C8C-B265-23E5D4AFE2B6}" dt="2025-10-21T09:15:38.698" v="908" actId="47"/>
-        <pc:sldMkLst>
-          <pc:docMk/>
-          <pc:sldMk cId="0" sldId="283"/>
-        </pc:sldMkLst>
-      </pc:sldChg>
-      <pc:sldChg chg="del">
-        <pc:chgData name="Abhinav Kothari" userId="2ad1c0a53281c2ab" providerId="LiveId" clId="{D6A6F71D-D2D6-4C8C-B265-23E5D4AFE2B6}" dt="2025-10-21T09:15:38.698" v="908" actId="47"/>
-        <pc:sldMkLst>
-          <pc:docMk/>
-          <pc:sldMk cId="0" sldId="284"/>
-        </pc:sldMkLst>
-      </pc:sldChg>
-      <pc:sldChg chg="del">
-        <pc:chgData name="Abhinav Kothari" userId="2ad1c0a53281c2ab" providerId="LiveId" clId="{D6A6F71D-D2D6-4C8C-B265-23E5D4AFE2B6}" dt="2025-10-21T09:15:38.698" v="908" actId="47"/>
-        <pc:sldMkLst>
-          <pc:docMk/>
-          <pc:sldMk cId="0" sldId="285"/>
-        </pc:sldMkLst>
-      </pc:sldChg>
-      <pc:sldChg chg="del">
-        <pc:chgData name="Abhinav Kothari" userId="2ad1c0a53281c2ab" providerId="LiveId" clId="{D6A6F71D-D2D6-4C8C-B265-23E5D4AFE2B6}" dt="2025-10-21T09:15:38.698" v="908" actId="47"/>
-        <pc:sldMkLst>
-          <pc:docMk/>
-          <pc:sldMk cId="0" sldId="286"/>
-        </pc:sldMkLst>
-      </pc:sldChg>
-      <pc:sldChg chg="del">
-        <pc:chgData name="Abhinav Kothari" userId="2ad1c0a53281c2ab" providerId="LiveId" clId="{D6A6F71D-D2D6-4C8C-B265-23E5D4AFE2B6}" dt="2025-10-21T09:15:38.698" v="908" actId="47"/>
-        <pc:sldMkLst>
-          <pc:docMk/>
-          <pc:sldMk cId="0" sldId="287"/>
-        </pc:sldMkLst>
-      </pc:sldChg>
-      <pc:sldChg chg="del">
-        <pc:chgData name="Abhinav Kothari" userId="2ad1c0a53281c2ab" providerId="LiveId" clId="{D6A6F71D-D2D6-4C8C-B265-23E5D4AFE2B6}" dt="2025-10-21T09:15:38.698" v="908" actId="47"/>
-        <pc:sldMkLst>
-          <pc:docMk/>
-          <pc:sldMk cId="0" sldId="288"/>
-        </pc:sldMkLst>
-      </pc:sldChg>
-      <pc:sldChg chg="del">
-        <pc:chgData name="Abhinav Kothari" userId="2ad1c0a53281c2ab" providerId="LiveId" clId="{D6A6F71D-D2D6-4C8C-B265-23E5D4AFE2B6}" dt="2025-10-21T09:15:38.698" v="908" actId="47"/>
-        <pc:sldMkLst>
-          <pc:docMk/>
-          <pc:sldMk cId="0" sldId="289"/>
-        </pc:sldMkLst>
-      </pc:sldChg>
-      <pc:sldChg chg="del">
-        <pc:chgData name="Abhinav Kothari" userId="2ad1c0a53281c2ab" providerId="LiveId" clId="{D6A6F71D-D2D6-4C8C-B265-23E5D4AFE2B6}" dt="2025-10-21T09:15:38.698" v="908" actId="47"/>
-        <pc:sldMkLst>
-          <pc:docMk/>
-          <pc:sldMk cId="0" sldId="290"/>
-        </pc:sldMkLst>
-      </pc:sldChg>
-      <pc:sldChg chg="del">
-        <pc:chgData name="Abhinav Kothari" userId="2ad1c0a53281c2ab" providerId="LiveId" clId="{D6A6F71D-D2D6-4C8C-B265-23E5D4AFE2B6}" dt="2025-10-21T09:15:40.503" v="909" actId="47"/>
-        <pc:sldMkLst>
-          <pc:docMk/>
-          <pc:sldMk cId="0" sldId="291"/>
-        </pc:sldMkLst>
-      </pc:sldChg>
-      <pc:sldChg chg="del">
-        <pc:chgData name="Abhinav Kothari" userId="2ad1c0a53281c2ab" providerId="LiveId" clId="{D6A6F71D-D2D6-4C8C-B265-23E5D4AFE2B6}" dt="2025-10-21T09:15:41.218" v="910" actId="47"/>
-        <pc:sldMkLst>
-          <pc:docMk/>
-          <pc:sldMk cId="0" sldId="292"/>
-        </pc:sldMkLst>
-      </pc:sldChg>
-      <pc:sldChg chg="del">
-        <pc:chgData name="Abhinav Kothari" userId="2ad1c0a53281c2ab" providerId="LiveId" clId="{D6A6F71D-D2D6-4C8C-B265-23E5D4AFE2B6}" dt="2025-10-21T09:15:41.386" v="911" actId="47"/>
-        <pc:sldMkLst>
-          <pc:docMk/>
-          <pc:sldMk cId="0" sldId="293"/>
-        </pc:sldMkLst>
-      </pc:sldChg>
-      <pc:sldChg chg="del">
-        <pc:chgData name="Abhinav Kothari" userId="2ad1c0a53281c2ab" providerId="LiveId" clId="{D6A6F71D-D2D6-4C8C-B265-23E5D4AFE2B6}" dt="2025-10-21T09:15:41.840" v="912" actId="47"/>
-        <pc:sldMkLst>
-          <pc:docMk/>
-          <pc:sldMk cId="0" sldId="294"/>
-        </pc:sldMkLst>
-      </pc:sldChg>
-      <pc:sldChg chg="del">
-        <pc:chgData name="Abhinav Kothari" userId="2ad1c0a53281c2ab" providerId="LiveId" clId="{D6A6F71D-D2D6-4C8C-B265-23E5D4AFE2B6}" dt="2025-10-21T09:15:41.999" v="913" actId="47"/>
-        <pc:sldMkLst>
-          <pc:docMk/>
-          <pc:sldMk cId="0" sldId="295"/>
-        </pc:sldMkLst>
-      </pc:sldChg>
-      <pc:sldChg chg="del">
-        <pc:chgData name="Abhinav Kothari" userId="2ad1c0a53281c2ab" providerId="LiveId" clId="{D6A6F71D-D2D6-4C8C-B265-23E5D4AFE2B6}" dt="2025-10-21T09:15:42.132" v="914" actId="47"/>
-        <pc:sldMkLst>
-          <pc:docMk/>
-          <pc:sldMk cId="0" sldId="296"/>
-        </pc:sldMkLst>
-      </pc:sldChg>
       <pc:sldChg chg="modTransition">
         <pc:chgData name="Abhinav Kothari" userId="2ad1c0a53281c2ab" providerId="LiveId" clId="{D6A6F71D-D2D6-4C8C-B265-23E5D4AFE2B6}" dt="2025-10-21T09:16:55.525" v="929"/>
         <pc:sldMkLst>
@@ -1287,22 +853,6 @@
           <pc:docMk/>
           <pc:sldMk cId="729748682" sldId="298"/>
         </pc:sldMkLst>
-        <pc:spChg chg="del mod ord">
-          <ac:chgData name="Abhinav Kothari" userId="2ad1c0a53281c2ab" providerId="LiveId" clId="{D6A6F71D-D2D6-4C8C-B265-23E5D4AFE2B6}" dt="2025-10-21T08:39:26.578" v="366" actId="700"/>
-          <ac:spMkLst>
-            <pc:docMk/>
-            <pc:sldMk cId="729748682" sldId="298"/>
-            <ac:spMk id="2" creationId="{5AAA0438-B383-E110-CF31-8E923266ECBB}"/>
-          </ac:spMkLst>
-        </pc:spChg>
-        <pc:spChg chg="del">
-          <ac:chgData name="Abhinav Kothari" userId="2ad1c0a53281c2ab" providerId="LiveId" clId="{D6A6F71D-D2D6-4C8C-B265-23E5D4AFE2B6}" dt="2025-10-21T08:39:26.578" v="366" actId="700"/>
-          <ac:spMkLst>
-            <pc:docMk/>
-            <pc:sldMk cId="729748682" sldId="298"/>
-            <ac:spMk id="3" creationId="{F1C3C779-709B-7DC6-E430-72E5186FB0A7}"/>
-          </ac:spMkLst>
-        </pc:spChg>
         <pc:spChg chg="add mod ord">
           <ac:chgData name="Abhinav Kothari" userId="2ad1c0a53281c2ab" providerId="LiveId" clId="{D6A6F71D-D2D6-4C8C-B265-23E5D4AFE2B6}" dt="2025-10-21T09:21:21.306" v="1047" actId="20577"/>
           <ac:spMkLst>
@@ -1334,13 +884,6 @@
             <ac:spMk id="5" creationId="{45496EE4-BE0E-F889-1F60-7BE09F9AF945}"/>
           </ac:spMkLst>
         </pc:spChg>
-      </pc:sldChg>
-      <pc:sldChg chg="add del">
-        <pc:chgData name="Abhinav Kothari" userId="2ad1c0a53281c2ab" providerId="LiveId" clId="{D6A6F71D-D2D6-4C8C-B265-23E5D4AFE2B6}" dt="2025-10-21T09:22:41.948" v="1072" actId="47"/>
-        <pc:sldMkLst>
-          <pc:docMk/>
-          <pc:sldMk cId="2066185599" sldId="300"/>
-        </pc:sldMkLst>
       </pc:sldChg>
       <pc:sldChg chg="modSp add mod">
         <pc:chgData name="Abhinav Kothari" userId="2ad1c0a53281c2ab" providerId="LiveId" clId="{D6A6F71D-D2D6-4C8C-B265-23E5D4AFE2B6}" dt="2025-10-21T11:00:57.410" v="3426" actId="5793"/>
@@ -1379,14 +922,6 @@
             <ac:spMk id="4" creationId="{54CB886F-A4DC-CFA8-4443-9A51FD4AAFD2}"/>
           </ac:spMkLst>
         </pc:spChg>
-        <pc:spChg chg="mod">
-          <ac:chgData name="Abhinav Kothari" userId="2ad1c0a53281c2ab" providerId="LiveId" clId="{D6A6F71D-D2D6-4C8C-B265-23E5D4AFE2B6}" dt="2025-10-21T13:04:13.351" v="3756" actId="20577"/>
-          <ac:spMkLst>
-            <pc:docMk/>
-            <pc:sldMk cId="981409818" sldId="302"/>
-            <ac:spMk id="5" creationId="{E6CB8B3A-6EB8-88C3-4B5D-790035042C7C}"/>
-          </ac:spMkLst>
-        </pc:spChg>
       </pc:sldChg>
       <pc:sldMasterChg chg="delSldLayout">
         <pc:chgData name="Abhinav Kothari" userId="2ad1c0a53281c2ab" providerId="LiveId" clId="{D6A6F71D-D2D6-4C8C-B265-23E5D4AFE2B6}" dt="2025-10-21T09:15:49.312" v="919" actId="47"/>
@@ -1394,69 +929,6 @@
           <pc:docMk/>
           <pc:sldMasterMk cId="0" sldId="2147483678"/>
         </pc:sldMasterMkLst>
-        <pc:sldLayoutChg chg="del">
-          <pc:chgData name="Abhinav Kothari" userId="2ad1c0a53281c2ab" providerId="LiveId" clId="{D6A6F71D-D2D6-4C8C-B265-23E5D4AFE2B6}" dt="2025-10-21T09:15:46.226" v="916" actId="47"/>
-          <pc:sldLayoutMkLst>
-            <pc:docMk/>
-            <pc:sldMasterMk cId="0" sldId="2147483678"/>
-            <pc:sldLayoutMk cId="0" sldId="2147483650"/>
-          </pc:sldLayoutMkLst>
-        </pc:sldLayoutChg>
-        <pc:sldLayoutChg chg="del">
-          <pc:chgData name="Abhinav Kothari" userId="2ad1c0a53281c2ab" providerId="LiveId" clId="{D6A6F71D-D2D6-4C8C-B265-23E5D4AFE2B6}" dt="2025-10-21T08:08:53.914" v="64" actId="2696"/>
-          <pc:sldLayoutMkLst>
-            <pc:docMk/>
-            <pc:sldMasterMk cId="0" sldId="2147483678"/>
-            <pc:sldLayoutMk cId="0" sldId="2147483661"/>
-          </pc:sldLayoutMkLst>
-        </pc:sldLayoutChg>
-        <pc:sldLayoutChg chg="del">
-          <pc:chgData name="Abhinav Kothari" userId="2ad1c0a53281c2ab" providerId="LiveId" clId="{D6A6F71D-D2D6-4C8C-B265-23E5D4AFE2B6}" dt="2025-10-21T09:15:44.917" v="915" actId="47"/>
-          <pc:sldLayoutMkLst>
-            <pc:docMk/>
-            <pc:sldMasterMk cId="0" sldId="2147483678"/>
-            <pc:sldLayoutMk cId="0" sldId="2147483663"/>
-          </pc:sldLayoutMkLst>
-        </pc:sldLayoutChg>
-        <pc:sldLayoutChg chg="del">
-          <pc:chgData name="Abhinav Kothari" userId="2ad1c0a53281c2ab" providerId="LiveId" clId="{D6A6F71D-D2D6-4C8C-B265-23E5D4AFE2B6}" dt="2025-10-21T09:15:49.312" v="919" actId="47"/>
-          <pc:sldLayoutMkLst>
-            <pc:docMk/>
-            <pc:sldMasterMk cId="0" sldId="2147483678"/>
-            <pc:sldLayoutMk cId="0" sldId="2147483666"/>
-          </pc:sldLayoutMkLst>
-        </pc:sldLayoutChg>
-        <pc:sldLayoutChg chg="del">
-          <pc:chgData name="Abhinav Kothari" userId="2ad1c0a53281c2ab" providerId="LiveId" clId="{D6A6F71D-D2D6-4C8C-B265-23E5D4AFE2B6}" dt="2025-10-21T09:15:47.230" v="917" actId="47"/>
-          <pc:sldLayoutMkLst>
-            <pc:docMk/>
-            <pc:sldMasterMk cId="0" sldId="2147483678"/>
-            <pc:sldLayoutMk cId="0" sldId="2147483671"/>
-          </pc:sldLayoutMkLst>
-        </pc:sldLayoutChg>
-      </pc:sldMasterChg>
-      <pc:sldMasterChg chg="del delSldLayout">
-        <pc:chgData name="Abhinav Kothari" userId="2ad1c0a53281c2ab" providerId="LiveId" clId="{D6A6F71D-D2D6-4C8C-B265-23E5D4AFE2B6}" dt="2025-10-21T09:15:42.132" v="914" actId="47"/>
-        <pc:sldMasterMkLst>
-          <pc:docMk/>
-          <pc:sldMasterMk cId="0" sldId="2147483679"/>
-        </pc:sldMasterMkLst>
-        <pc:sldLayoutChg chg="del">
-          <pc:chgData name="Abhinav Kothari" userId="2ad1c0a53281c2ab" providerId="LiveId" clId="{D6A6F71D-D2D6-4C8C-B265-23E5D4AFE2B6}" dt="2025-10-21T09:15:42.132" v="914" actId="47"/>
-          <pc:sldLayoutMkLst>
-            <pc:docMk/>
-            <pc:sldMasterMk cId="0" sldId="2147483679"/>
-            <pc:sldLayoutMk cId="0" sldId="2147483676"/>
-          </pc:sldLayoutMkLst>
-        </pc:sldLayoutChg>
-        <pc:sldLayoutChg chg="del">
-          <pc:chgData name="Abhinav Kothari" userId="2ad1c0a53281c2ab" providerId="LiveId" clId="{D6A6F71D-D2D6-4C8C-B265-23E5D4AFE2B6}" dt="2025-10-21T09:15:41.999" v="913" actId="47"/>
-          <pc:sldLayoutMkLst>
-            <pc:docMk/>
-            <pc:sldMasterMk cId="0" sldId="2147483679"/>
-            <pc:sldLayoutMk cId="0" sldId="2147483677"/>
-          </pc:sldLayoutMkLst>
-        </pc:sldLayoutChg>
       </pc:sldMasterChg>
     </pc:docChg>
   </pc:docChgLst>
@@ -10764,21 +10236,21 @@
             <a:pPr marL="171450" indent="-171450"/>
             <a:r>
               <a:rPr lang="en-US" dirty="0"/>
-              <a:t>Checking for mailbox and finding nothing can be annoying and waste of time</a:t>
+              <a:t>Checking for mailbox and finding nothing can be annoying and a waste of time</a:t>
             </a:r>
           </a:p>
           <a:p>
             <a:pPr marL="171450" indent="-171450"/>
             <a:r>
               <a:rPr lang="en-US" dirty="0"/>
-              <a:t>Unchecked post for long time if professor busy</a:t>
+              <a:t>Posts can remain unchecked for a long time if professor is busy</a:t>
             </a:r>
           </a:p>
           <a:p>
             <a:pPr marL="171450" indent="-171450"/>
             <a:r>
               <a:rPr lang="en-US" dirty="0"/>
-              <a:t>No way of knowing if post received if away</a:t>
+              <a:t>No way of knowing if post received if away (e.g., on conference/vacation)</a:t>
             </a:r>
             <a:endParaRPr dirty="0"/>
           </a:p>

</xml_diff>